<commit_message>
update readme with repl link for prototype and add notes to presentation
</commit_message>
<xml_diff>
--- a/PPT Presentations/DesignPatterns-Lab1-CreationalPatterns.pptx
+++ b/PPT Presentations/DesignPatterns-Lab1-CreationalPatterns.pptx
@@ -20913,6 +20913,18 @@
           <a:lstStyle/>
           <a:p>
             <a:r>
+              <a:rPr lang="en-US" sz="2800" b="0" i="0" dirty="0">
+                <a:solidFill>
+                  <a:srgbClr val="575757"/>
+                </a:solidFill>
+                <a:effectLst/>
+                <a:latin typeface="Roboto"/>
+              </a:rPr>
+              <a:t>The essential thing when approaching design patterns is to utilize them in a way that improves our codebase. The above means that we sometimes can bend them to fit our needs. They are commonly associated with object-oriented programming. That doesn’t change the fact that we can take its fundamentals and apply them to something else.</a:t>
+            </a:r>
+          </a:p>
+          <a:p>
+            <a:r>
               <a:rPr lang="en-US" sz="1800" dirty="0">
                 <a:effectLst/>
                 <a:latin typeface="Segoe UI" panose="020B0502040204020203" pitchFamily="34" charset="0"/>
@@ -22408,7 +22420,61 @@
           <a:bodyPr/>
           <a:lstStyle/>
           <a:p>
-            <a:endParaRPr lang="en-US" dirty="0"/>
+            <a:r>
+              <a:rPr lang="en-US" dirty="0"/>
+              <a:t>The most common and easy to implement pattern.</a:t>
+            </a:r>
+          </a:p>
+          <a:p>
+            <a:pPr marL="0" marR="0" lvl="0" indent="0" algn="l" defTabSz="914400" rtl="0" eaLnBrk="1" fontAlgn="auto" latinLnBrk="0" hangingPunct="1">
+              <a:lnSpc>
+                <a:spcPct val="100000"/>
+              </a:lnSpc>
+              <a:spcBef>
+                <a:spcPts val="0"/>
+              </a:spcBef>
+              <a:spcAft>
+                <a:spcPts val="0"/>
+              </a:spcAft>
+              <a:buClrTx/>
+              <a:buSzTx/>
+              <a:buFontTx/>
+              <a:buNone/>
+              <a:tabLst/>
+              <a:defRPr/>
+            </a:pPr>
+            <a:r>
+              <a:rPr lang="en-US" dirty="0"/>
+              <a:t>Used too much, might slow down your app, becomes a problem if you’re not careful to make it thread safe.</a:t>
+            </a:r>
+          </a:p>
+          <a:p>
+            <a:r>
+              <a:rPr lang="en-US" dirty="0"/>
+              <a:t>Three important characteristics: only one instance, lazy-loading, thread-safe.</a:t>
+            </a:r>
+          </a:p>
+          <a:p>
+            <a:r>
+              <a:rPr lang="en-US" dirty="0"/>
+              <a:t>Lazy loading vs eager loading = load when you actually need something (if null, instantiate) vs </a:t>
+            </a:r>
+            <a:r>
+              <a:rPr lang="en-US" dirty="0" err="1"/>
+              <a:t>init</a:t>
+            </a:r>
+            <a:r>
+              <a:rPr lang="en-US" dirty="0"/>
+              <a:t> resources as soon as code is executed (</a:t>
+            </a:r>
+            <a:r>
+              <a:rPr lang="en-US" dirty="0" err="1"/>
+              <a:t>e.g</a:t>
+            </a:r>
+            <a:r>
+              <a:rPr lang="en-US" dirty="0"/>
+              <a:t> loading at the beginning of website, setup)</a:t>
+            </a:r>
           </a:p>
         </p:txBody>
       </p:sp>
@@ -22576,7 +22642,64 @@
           <a:bodyPr/>
           <a:lstStyle/>
           <a:p>
-            <a:endParaRPr lang="en-US" dirty="0"/>
+            <a:r>
+              <a:rPr lang="en-US" dirty="0"/>
+              <a:t>It helps improve object creation costs. </a:t>
+            </a:r>
+          </a:p>
+          <a:p>
+            <a:r>
+              <a:rPr lang="en-US" dirty="0"/>
+              <a:t>You will probably refactor it than implementing at the start of the project. How it’s done, you usually start having performance issues, because it’s costly to create huge objects.</a:t>
+            </a:r>
+          </a:p>
+          <a:p>
+            <a:r>
+              <a:rPr lang="en-US" dirty="0"/>
+              <a:t>No subclasses, it’s an interface. </a:t>
+            </a:r>
+          </a:p>
+          <a:p>
+            <a:r>
+              <a:rPr lang="en-US" dirty="0"/>
+              <a:t>You don’t use “new”, you use clone method</a:t>
+            </a:r>
+          </a:p>
+          <a:p>
+            <a:r>
+              <a:rPr lang="en-US" dirty="0"/>
+              <a:t>Even if it is a copy, each object is a new instance, so it’s not like in the singleton situation.</a:t>
+            </a:r>
+          </a:p>
+          <a:p>
+            <a:r>
+              <a:rPr lang="en-US" dirty="0"/>
+              <a:t>One important concept here: shallow copy vs deep copy.</a:t>
+            </a:r>
+          </a:p>
+          <a:p>
+            <a:r>
+              <a:rPr lang="en-US" dirty="0"/>
+              <a:t>The difference stays in memory location. I make a shallow copy B of object A, B will point to location of A (not for primitive types, obviously). </a:t>
+            </a:r>
+          </a:p>
+          <a:p>
+            <a:r>
+              <a:rPr lang="en-US" dirty="0"/>
+              <a:t>If I change something in A, B will be changed as well.</a:t>
+            </a:r>
+          </a:p>
+          <a:p>
+            <a:r>
+              <a:rPr lang="en-US" dirty="0"/>
+              <a:t>If I make a deep copy, I copy everything from A in B, is like a fresh copy.</a:t>
+            </a:r>
+          </a:p>
+          <a:p>
+            <a:r>
+              <a:rPr lang="en-US" dirty="0"/>
+              <a:t>There are ways of creating deep copies, it’s more costly, it’s complicated, recursive. </a:t>
+            </a:r>
           </a:p>
         </p:txBody>
       </p:sp>
@@ -27221,45 +27344,60 @@
         <p:spPr/>
         <p:txBody>
           <a:bodyPr>
-            <a:normAutofit fontScale="92500"/>
+            <a:normAutofit fontScale="85000" lnSpcReduction="10000"/>
           </a:bodyPr>
           <a:lstStyle/>
           <a:p>
             <a:r>
               <a:rPr lang="en-US" dirty="0"/>
-              <a:t>Firebase: </a:t>
-            </a:r>
+              <a:t>JavaScript: ES6 modules</a:t>
+            </a:r>
+          </a:p>
+          <a:p>
             <a:r>
               <a:rPr lang="en-US" dirty="0">
                 <a:hlinkClick r:id="rId8"/>
               </a:rPr>
-              <a:t>https://firebase.google.com/docs/reference/android/com/google/firebase/auth/FirebaseAuth</a:t>
+              <a:t>https://codesandbox.io/s/es6-singletons-gwrv3</a:t>
             </a:r>
             <a:endParaRPr lang="en-US" dirty="0"/>
           </a:p>
           <a:p>
             <a:r>
               <a:rPr lang="en-US" dirty="0"/>
-              <a:t>Java: </a:t>
+              <a:t>Firebase: </a:t>
             </a:r>
             <a:r>
               <a:rPr lang="en-US" dirty="0">
                 <a:hlinkClick r:id="rId9"/>
               </a:rPr>
-              <a:t>https://docs.oracle.com/javase/8/docs/api/java/lang/System.html#getSecurityManager--</a:t>
+              <a:t>https://firebase.google.com/docs/reference/android/com/google/firebase/auth/FirebaseAuth</a:t>
             </a:r>
             <a:endParaRPr lang="en-US" dirty="0"/>
           </a:p>
           <a:p>
             <a:r>
               <a:rPr lang="en-US" dirty="0"/>
-              <a:t>Redux: the state tree from redux </a:t>
-            </a:r>
+              <a:t>Java: </a:t>
+            </a:r>
+            <a:r>
+              <a:rPr lang="en-US" dirty="0">
+                <a:hlinkClick r:id="rId10"/>
+              </a:rPr>
+              <a:t>https://docs.oracle.com/javase/8/docs/api/java/lang/System.html#getSecurityManager--</a:t>
+            </a:r>
+            <a:endParaRPr lang="en-US" dirty="0"/>
           </a:p>
           <a:p>
             <a:r>
+              <a:rPr lang="en-US" dirty="0"/>
+              <a:t>Redux: the state tree from redux </a:t>
+            </a:r>
+          </a:p>
+          <a:p>
+            <a:r>
               <a:rPr lang="en-US" dirty="0">
-                <a:hlinkClick r:id="rId10"/>
+                <a:hlinkClick r:id="rId11"/>
               </a:rPr>
               <a:t>https://redux.js.org/understanding/thinking-in-redux/three-principles</a:t>
             </a:r>
@@ -27963,7 +28101,7 @@
         <p:spPr/>
         <p:txBody>
           <a:bodyPr>
-            <a:normAutofit/>
+            <a:normAutofit fontScale="85000" lnSpcReduction="10000"/>
           </a:bodyPr>
           <a:lstStyle/>
           <a:p>
@@ -27974,33 +28112,54 @@
           </a:p>
           <a:p>
             <a:r>
-              <a:rPr lang="en-US" dirty="0"/>
-              <a:t>Java: </a:t>
-            </a:r>
-            <a:r>
               <a:rPr lang="en-US" dirty="0">
                 <a:hlinkClick r:id="rId8"/>
               </a:rPr>
-              <a:t>https://docs.oracle.com/javase/8/docs/api/java/lang/Cloneable.html</a:t>
+              <a:t>https://repl.it/@khaled_hossain_code/prototype</a:t>
             </a:r>
             <a:endParaRPr lang="en-US" dirty="0"/>
           </a:p>
           <a:p>
             <a:r>
               <a:rPr lang="en-US" dirty="0"/>
-              <a:t>C#: </a:t>
-            </a:r>
-          </a:p>
-          <a:p>
+              <a:t>Java: </a:t>
+            </a:r>
             <a:r>
               <a:rPr lang="en-US" dirty="0">
                 <a:hlinkClick r:id="rId9"/>
               </a:rPr>
-              <a:t>https://docs.microsoft.com/en-us/dotnet/api/system.icloneable?view=net-5.0</a:t>
+              <a:t>https://docs.oracle.com/javase/8/docs/api/java/lang/Cloneable.html</a:t>
             </a:r>
             <a:endParaRPr lang="en-US" dirty="0"/>
           </a:p>
           <a:p>
+            <a:r>
+              <a:rPr lang="en-US" dirty="0"/>
+              <a:t>C#: </a:t>
+            </a:r>
+          </a:p>
+          <a:p>
+            <a:r>
+              <a:rPr lang="en-US" dirty="0">
+                <a:hlinkClick r:id="rId10"/>
+              </a:rPr>
+              <a:t>https://docs.microsoft.com/en-us/dotnet/api/system.icloneable?view=net-5.0</a:t>
+            </a:r>
+            <a:endParaRPr lang="en-US" dirty="0"/>
+          </a:p>
+          <a:p>
+            <a:r>
+              <a:rPr lang="en-US" dirty="0"/>
+              <a:t>Python: copy module </a:t>
+            </a:r>
+          </a:p>
+          <a:p>
+            <a:r>
+              <a:rPr lang="en-US" dirty="0">
+                <a:hlinkClick r:id="rId11"/>
+              </a:rPr>
+              <a:t>https://docs.python.org/2/library/copy.html</a:t>
+            </a:r>
             <a:endParaRPr lang="en-US" dirty="0"/>
           </a:p>
         </p:txBody>
@@ -31955,6 +32114,15 @@
 </file>
 
 <file path=customXml/item2.xml><?xml version="1.0" encoding="utf-8"?>
+<?mso-contentType ?>
+<FormTemplates xmlns="http://schemas.microsoft.com/sharepoint/v3/contenttype/forms">
+  <Display>DocumentLibraryForm</Display>
+  <Edit>DocumentLibraryForm</Edit>
+  <New>DocumentLibraryForm</New>
+</FormTemplates>
+</file>
+
+<file path=customXml/item3.xml><?xml version="1.0" encoding="utf-8"?>
 <ct:contentTypeSchema xmlns:ct="http://schemas.microsoft.com/office/2006/metadata/contentType" xmlns:ma="http://schemas.microsoft.com/office/2006/metadata/properties/metaAttributes" ct:_="" ma:_="" ma:contentTypeName="Document" ma:contentTypeID="0x01010079F111ED35F8CC479449609E8A0923A6" ma:contentTypeVersion="12" ma:contentTypeDescription="Create a new document." ma:contentTypeScope="" ma:versionID="426e97fa315356fffbdcd9876fe988c2">
   <xsd:schema xmlns:xsd="http://www.w3.org/2001/XMLSchema" xmlns:xs="http://www.w3.org/2001/XMLSchema" xmlns:p="http://schemas.microsoft.com/office/2006/metadata/properties" xmlns:ns2="71af3243-3dd4-4a8d-8c0d-dd76da1f02a5" xmlns:ns3="16c05727-aa75-4e4a-9b5f-8a80a1165891" targetNamespace="http://schemas.microsoft.com/office/2006/metadata/properties" ma:root="true" ma:fieldsID="14b8f0def80e6d70ce3def20c90759ae" ns2:_="" ns3:_="">
     <xsd:import namespace="71af3243-3dd4-4a8d-8c0d-dd76da1f02a5"/>
@@ -32175,15 +32343,6 @@
 </ct:contentTypeSchema>
 </file>
 
-<file path=customXml/item3.xml><?xml version="1.0" encoding="utf-8"?>
-<?mso-contentType ?>
-<FormTemplates xmlns="http://schemas.microsoft.com/sharepoint/v3/contenttype/forms">
-  <Display>DocumentLibraryForm</Display>
-  <Edit>DocumentLibraryForm</Edit>
-  <New>DocumentLibraryForm</New>
-</FormTemplates>
-</file>
-
 <file path=customXml/itemProps1.xml><?xml version="1.0" encoding="utf-8"?>
 <ds:datastoreItem xmlns:ds="http://schemas.openxmlformats.org/officeDocument/2006/customXml" ds:itemID="{84F503EC-3FFF-4193-A86F-39150E2BAC75}">
   <ds:schemaRefs>
@@ -32195,6 +32354,14 @@
 </file>
 
 <file path=customXml/itemProps2.xml><?xml version="1.0" encoding="utf-8"?>
+<ds:datastoreItem xmlns:ds="http://schemas.openxmlformats.org/officeDocument/2006/customXml" ds:itemID="{2E5ECA37-C458-4BA2-A090-D7A19E07B434}">
+  <ds:schemaRefs>
+    <ds:schemaRef ds:uri="http://schemas.microsoft.com/sharepoint/v3/contenttype/forms"/>
+  </ds:schemaRefs>
+</ds:datastoreItem>
+</file>
+
+<file path=customXml/itemProps3.xml><?xml version="1.0" encoding="utf-8"?>
 <ds:datastoreItem xmlns:ds="http://schemas.openxmlformats.org/officeDocument/2006/customXml" ds:itemID="{7A26AAF5-6CFC-4C52-B7DF-08410EDE6701}">
   <ds:schemaRefs>
     <ds:schemaRef ds:uri="http://schemas.microsoft.com/office/2006/metadata/contentType"/>
@@ -32211,12 +32378,4 @@
     <ds:schemaRef ds:uri="http://schemas.microsoft.com/internal/obd"/>
   </ds:schemaRefs>
 </ds:datastoreItem>
-</file>
-
-<file path=customXml/itemProps3.xml><?xml version="1.0" encoding="utf-8"?>
-<ds:datastoreItem xmlns:ds="http://schemas.openxmlformats.org/officeDocument/2006/customXml" ds:itemID="{2E5ECA37-C458-4BA2-A090-D7A19E07B434}">
-  <ds:schemaRefs>
-    <ds:schemaRef ds:uri="http://schemas.microsoft.com/sharepoint/v3/contenttype/forms"/>
-  </ds:schemaRefs>
-</ds:datastoreItem>
 </file>
</xml_diff>

<commit_message>
add structural patterns ppt: bridge, composite, adapter
</commit_message>
<xml_diff>
--- a/PPT Presentations/DesignPatterns-Lab1-CreationalPatterns.pptx
+++ b/PPT Presentations/DesignPatterns-Lab1-CreationalPatterns.pptx
@@ -12,16 +12,16 @@
     <p:sldId id="286" r:id="rId6"/>
     <p:sldId id="288" r:id="rId7"/>
     <p:sldId id="289" r:id="rId8"/>
-    <p:sldId id="290" r:id="rId9"/>
-    <p:sldId id="293" r:id="rId10"/>
-    <p:sldId id="291" r:id="rId11"/>
-    <p:sldId id="294" r:id="rId12"/>
+    <p:sldId id="296" r:id="rId9"/>
+    <p:sldId id="297" r:id="rId10"/>
+    <p:sldId id="298" r:id="rId11"/>
+    <p:sldId id="299" r:id="rId12"/>
     <p:sldId id="292" r:id="rId13"/>
     <p:sldId id="295" r:id="rId14"/>
-    <p:sldId id="296" r:id="rId15"/>
-    <p:sldId id="297" r:id="rId16"/>
-    <p:sldId id="298" r:id="rId17"/>
-    <p:sldId id="299" r:id="rId18"/>
+    <p:sldId id="290" r:id="rId15"/>
+    <p:sldId id="293" r:id="rId16"/>
+    <p:sldId id="291" r:id="rId17"/>
+    <p:sldId id="294" r:id="rId18"/>
     <p:sldId id="287" r:id="rId19"/>
   </p:sldIdLst>
   <p:sldSz cx="12192000" cy="6858000"/>
@@ -5485,8 +5485,8 @@
             </a:lnSpc>
           </a:pPr>
           <a:r>
-            <a:rPr lang="en-US"/>
-            <a:t>Common interface for products, implemented by concrete classes. The client does not know with what kind of product it works.</a:t>
+            <a:rPr lang="en-US" dirty="0"/>
+            <a:t>Think of it as having the same advantages and disadvantages as global variables</a:t>
           </a:r>
         </a:p>
       </dgm:t>
@@ -5526,8 +5526,8 @@
             </a:lnSpc>
           </a:pPr>
           <a:r>
-            <a:rPr lang="en-US"/>
-            <a:t>Usually, you have a parameter used to decide which concrete class is going to be instantiated. </a:t>
+            <a:rPr lang="en-US" dirty="0"/>
+            <a:t>A lot of developers consider Singleton as an anti pattern</a:t>
           </a:r>
         </a:p>
       </dgm:t>
@@ -5567,8 +5567,8 @@
             </a:lnSpc>
           </a:pPr>
           <a:r>
-            <a:rPr lang="en-US"/>
-            <a:t>If you want to choose the type of a product (object) at runtime, factory is the only one suited for that.</a:t>
+            <a:rPr lang="en-US" dirty="0"/>
+            <a:t>Recognize it by identifying a static method to get a resource</a:t>
           </a:r>
         </a:p>
       </dgm:t>
@@ -5608,8 +5608,8 @@
             </a:lnSpc>
           </a:pPr>
           <a:r>
-            <a:rPr lang="en-US"/>
-            <a:t>Any function. It is NOT a class, NOT a constructor, it returns an object.</a:t>
+            <a:rPr lang="en-US" dirty="0"/>
+            <a:t>Usages: logging class, manage database connection (or a pool of connections), global state </a:t>
           </a:r>
         </a:p>
       </dgm:t>
@@ -5880,7 +5880,7 @@
   <dgm:whole/>
   <dgm:extLst>
     <a:ext uri="http://schemas.microsoft.com/office/drawing/2008/diagram">
-      <dsp:dataModelExt xmlns:dsp="http://schemas.microsoft.com/office/drawing/2008/diagram" relId="rId6" minVer="http://schemas.openxmlformats.org/drawingml/2006/diagram"/>
+      <dsp:dataModelExt xmlns:dsp="http://schemas.microsoft.com/office/drawing/2008/diagram" relId="rId7" minVer="http://schemas.openxmlformats.org/drawingml/2006/diagram"/>
     </a:ext>
   </dgm:extLst>
 </dgm:dataModel>
@@ -5914,7 +5914,7 @@
           </a:pPr>
           <a:r>
             <a:rPr lang="en-US" dirty="0"/>
-            <a:t>Solves a specific problem: groups factories. It’s more like a framework. Keyword: family of factories</a:t>
+            <a:t>All objects that support cloning need to follow the same interface</a:t>
           </a:r>
         </a:p>
       </dgm:t>
@@ -5954,9 +5954,10 @@
             </a:lnSpc>
           </a:pPr>
           <a:r>
-            <a:rPr lang="en-US" dirty="0"/>
-            <a:t>Usually, you start with a factory and realize you need a family of products and extend to abstract factory.</a:t>
+            <a:rPr lang="en-US" b="0" i="0" dirty="0"/>
+            <a:t>Clone an object when, at runtime, you need a “true” copy of an object. (the actual copy of the object, with its current values)</a:t>
           </a:r>
+          <a:endParaRPr lang="en-US" dirty="0"/>
         </a:p>
       </dgm:t>
     </dgm:pt>
@@ -5996,7 +5997,7 @@
           </a:pPr>
           <a:r>
             <a:rPr lang="en-US" dirty="0"/>
-            <a:t>Recognizable by creational methods returning the factory itself, which in turn can be used to create another abstract/interface type</a:t>
+            <a:t>Recognize it “clone” or “copy” method</a:t>
           </a:r>
         </a:p>
       </dgm:t>
@@ -6037,7 +6038,7 @@
           </a:pPr>
           <a:r>
             <a:rPr lang="en-US" dirty="0"/>
-            <a:t>Is a bit complex, a lot of code, might be difficult to implement. It’s something that you design rather in the beginning, it’s hard to refactor.</a:t>
+            <a:t>Use it when it is costly to create new objects from scratch</a:t>
           </a:r>
         </a:p>
       </dgm:t>
@@ -6161,7 +6162,7 @@
       <dgm:spPr/>
     </dgm:pt>
     <dgm:pt modelId="{7DE8E408-DE79-443F-8629-C089FBA689E3}" type="pres">
-      <dgm:prSet presAssocID="{F8289849-E987-4255-8EC8-44B4F81CB10E}" presName="parTx" presStyleLbl="revTx" presStyleIdx="1" presStyleCnt="4">
+      <dgm:prSet presAssocID="{F8289849-E987-4255-8EC8-44B4F81CB10E}" presName="parTx" presStyleLbl="revTx" presStyleIdx="1" presStyleCnt="4" custLinFactNeighborY="-1262">
         <dgm:presLayoutVars>
           <dgm:chMax val="0"/>
           <dgm:chPref val="0"/>
@@ -6308,7 +6309,7 @@
   <dgm:whole/>
   <dgm:extLst>
     <a:ext uri="http://schemas.microsoft.com/office/drawing/2008/diagram">
-      <dsp:dataModelExt xmlns:dsp="http://schemas.microsoft.com/office/drawing/2008/diagram" relId="rId6" minVer="http://schemas.openxmlformats.org/drawingml/2006/diagram"/>
+      <dsp:dataModelExt xmlns:dsp="http://schemas.microsoft.com/office/drawing/2008/diagram" relId="rId7" minVer="http://schemas.openxmlformats.org/drawingml/2006/diagram"/>
     </a:ext>
   </dgm:extLst>
 </dgm:dataModel>
@@ -6803,8 +6804,8 @@
             </a:lnSpc>
           </a:pPr>
           <a:r>
-            <a:rPr lang="en-US" dirty="0"/>
-            <a:t>Think of it as having the same advantages and disadvantages as global variables</a:t>
+            <a:rPr lang="en-US"/>
+            <a:t>Common interface for products, implemented by concrete classes. The client does not know with what kind of product it works.</a:t>
           </a:r>
         </a:p>
       </dgm:t>
@@ -6844,8 +6845,8 @@
             </a:lnSpc>
           </a:pPr>
           <a:r>
-            <a:rPr lang="en-US" dirty="0"/>
-            <a:t>A lot of developers consider Singleton as an anti pattern</a:t>
+            <a:rPr lang="en-US"/>
+            <a:t>Usually, you have a parameter used to decide which concrete class is going to be instantiated. </a:t>
           </a:r>
         </a:p>
       </dgm:t>
@@ -6885,8 +6886,8 @@
             </a:lnSpc>
           </a:pPr>
           <a:r>
-            <a:rPr lang="en-US" dirty="0"/>
-            <a:t>Recognize it by identifying a static method to get a resource</a:t>
+            <a:rPr lang="en-US"/>
+            <a:t>If you want to choose the type of a product (object) at runtime, factory is the only one suited for that.</a:t>
           </a:r>
         </a:p>
       </dgm:t>
@@ -6926,8 +6927,8 @@
             </a:lnSpc>
           </a:pPr>
           <a:r>
-            <a:rPr lang="en-US" dirty="0"/>
-            <a:t>Usages: logging class, manage database connection (or a pool of connections), global state </a:t>
+            <a:rPr lang="en-US"/>
+            <a:t>Any function. It is NOT a class, NOT a constructor, it returns an object.</a:t>
           </a:r>
         </a:p>
       </dgm:t>
@@ -7198,7 +7199,7 @@
   <dgm:whole/>
   <dgm:extLst>
     <a:ext uri="http://schemas.microsoft.com/office/drawing/2008/diagram">
-      <dsp:dataModelExt xmlns:dsp="http://schemas.microsoft.com/office/drawing/2008/diagram" relId="rId7" minVer="http://schemas.openxmlformats.org/drawingml/2006/diagram"/>
+      <dsp:dataModelExt xmlns:dsp="http://schemas.microsoft.com/office/drawing/2008/diagram" relId="rId6" minVer="http://schemas.openxmlformats.org/drawingml/2006/diagram"/>
     </a:ext>
   </dgm:extLst>
 </dgm:dataModel>
@@ -7232,7 +7233,7 @@
           </a:pPr>
           <a:r>
             <a:rPr lang="en-US" dirty="0"/>
-            <a:t>All objects that support cloning need to follow the same interface</a:t>
+            <a:t>Solves a specific problem: groups factories. It’s more like a framework. Keyword: family of factories</a:t>
           </a:r>
         </a:p>
       </dgm:t>
@@ -7272,10 +7273,9 @@
             </a:lnSpc>
           </a:pPr>
           <a:r>
-            <a:rPr lang="en-US" b="0" i="0" dirty="0"/>
-            <a:t>Clone an object when, at runtime, you need a “true” copy of an object. (the actual copy of the object, with its current values)</a:t>
+            <a:rPr lang="en-US" dirty="0"/>
+            <a:t>Usually, you start with a factory and realize you need a family of products and extend to abstract factory.</a:t>
           </a:r>
-          <a:endParaRPr lang="en-US" dirty="0"/>
         </a:p>
       </dgm:t>
     </dgm:pt>
@@ -7315,7 +7315,7 @@
           </a:pPr>
           <a:r>
             <a:rPr lang="en-US" dirty="0"/>
-            <a:t>Recognize it “clone” or “copy” method</a:t>
+            <a:t>Recognizable by creational methods returning the factory itself, which in turn can be used to create another abstract/interface type</a:t>
           </a:r>
         </a:p>
       </dgm:t>
@@ -7356,7 +7356,7 @@
           </a:pPr>
           <a:r>
             <a:rPr lang="en-US" dirty="0"/>
-            <a:t>Use it when it is costly to create new objects from scratch</a:t>
+            <a:t>Is a bit complex, a lot of code, might be difficult to implement. It’s something that you design rather in the beginning, it’s hard to refactor.</a:t>
           </a:r>
         </a:p>
       </dgm:t>
@@ -7480,7 +7480,7 @@
       <dgm:spPr/>
     </dgm:pt>
     <dgm:pt modelId="{7DE8E408-DE79-443F-8629-C089FBA689E3}" type="pres">
-      <dgm:prSet presAssocID="{F8289849-E987-4255-8EC8-44B4F81CB10E}" presName="parTx" presStyleLbl="revTx" presStyleIdx="1" presStyleCnt="4" custLinFactNeighborY="-1262">
+      <dgm:prSet presAssocID="{F8289849-E987-4255-8EC8-44B4F81CB10E}" presName="parTx" presStyleLbl="revTx" presStyleIdx="1" presStyleCnt="4">
         <dgm:presLayoutVars>
           <dgm:chMax val="0"/>
           <dgm:chPref val="0"/>
@@ -7627,7 +7627,7 @@
   <dgm:whole/>
   <dgm:extLst>
     <a:ext uri="http://schemas.microsoft.com/office/drawing/2008/diagram">
-      <dsp:dataModelExt xmlns:dsp="http://schemas.microsoft.com/office/drawing/2008/diagram" relId="rId7" minVer="http://schemas.openxmlformats.org/drawingml/2006/diagram"/>
+      <dsp:dataModelExt xmlns:dsp="http://schemas.microsoft.com/office/drawing/2008/diagram" relId="rId6" minVer="http://schemas.openxmlformats.org/drawingml/2006/diagram"/>
     </a:ext>
   </dgm:extLst>
 </dgm:dataModel>
@@ -8925,8 +8925,8 @@
             <a:buNone/>
           </a:pPr>
           <a:r>
-            <a:rPr lang="en-US" sz="1400" kern="1200"/>
-            <a:t>Common interface for products, implemented by concrete classes. The client does not know with what kind of product it works.</a:t>
+            <a:rPr lang="en-US" sz="1400" kern="1200" dirty="0"/>
+            <a:t>Think of it as having the same advantages and disadvantages as global variables</a:t>
           </a:r>
         </a:p>
       </dsp:txBody>
@@ -9083,8 +9083,8 @@
             <a:buNone/>
           </a:pPr>
           <a:r>
-            <a:rPr lang="en-US" sz="1400" kern="1200"/>
-            <a:t>Usually, you have a parameter used to decide which concrete class is going to be instantiated. </a:t>
+            <a:rPr lang="en-US" sz="1400" kern="1200" dirty="0"/>
+            <a:t>A lot of developers consider Singleton as an anti pattern</a:t>
           </a:r>
         </a:p>
       </dsp:txBody>
@@ -9241,8 +9241,8 @@
             <a:buNone/>
           </a:pPr>
           <a:r>
-            <a:rPr lang="en-US" sz="1400" kern="1200"/>
-            <a:t>If you want to choose the type of a product (object) at runtime, factory is the only one suited for that.</a:t>
+            <a:rPr lang="en-US" sz="1400" kern="1200" dirty="0"/>
+            <a:t>Recognize it by identifying a static method to get a resource</a:t>
           </a:r>
         </a:p>
       </dsp:txBody>
@@ -9399,8 +9399,8 @@
             <a:buNone/>
           </a:pPr>
           <a:r>
-            <a:rPr lang="en-US" sz="1400" kern="1200"/>
-            <a:t>Any function. It is NOT a class, NOT a constructor, it returns an object.</a:t>
+            <a:rPr lang="en-US" sz="1400" kern="1200" dirty="0"/>
+            <a:t>Usages: logging class, manage database connection (or a pool of connections), global state </a:t>
           </a:r>
         </a:p>
       </dsp:txBody>
@@ -9570,7 +9570,7 @@
           </a:pPr>
           <a:r>
             <a:rPr lang="en-US" sz="1400" kern="1200" dirty="0"/>
-            <a:t>Solves a specific problem: groups factories. It’s more like a framework. Keyword: family of factories</a:t>
+            <a:t>All objects that support cloning need to follow the same interface</a:t>
           </a:r>
         </a:p>
       </dsp:txBody>
@@ -9684,7 +9684,7 @@
       </dsp:nvSpPr>
       <dsp:spPr>
         <a:xfrm>
-          <a:off x="910646" y="987103"/>
+          <a:off x="910646" y="977153"/>
           <a:ext cx="3729089" cy="788438"/>
         </a:xfrm>
         <a:prstGeom prst="rect">
@@ -9727,13 +9727,14 @@
             <a:buNone/>
           </a:pPr>
           <a:r>
-            <a:rPr lang="en-US" sz="1400" kern="1200" dirty="0"/>
-            <a:t>Usually, you start with a factory and realize you need a family of products and extend to abstract factory.</a:t>
+            <a:rPr lang="en-US" sz="1400" b="0" i="0" kern="1200" dirty="0"/>
+            <a:t>Clone an object when, at runtime, you need a “true” copy of an object. (the actual copy of the object, with its current values)</a:t>
           </a:r>
+          <a:endParaRPr lang="en-US" sz="1400" kern="1200" dirty="0"/>
         </a:p>
       </dsp:txBody>
       <dsp:txXfrm>
-        <a:off x="910646" y="987103"/>
+        <a:off x="910646" y="977153"/>
         <a:ext cx="3729089" cy="788438"/>
       </dsp:txXfrm>
     </dsp:sp>
@@ -9886,7 +9887,7 @@
           </a:pPr>
           <a:r>
             <a:rPr lang="en-US" sz="1400" kern="1200" dirty="0"/>
-            <a:t>Recognizable by creational methods returning the factory itself, which in turn can be used to create another abstract/interface type</a:t>
+            <a:t>Recognize it “clone” or “copy” method</a:t>
           </a:r>
         </a:p>
       </dsp:txBody>
@@ -10044,7 +10045,7 @@
           </a:pPr>
           <a:r>
             <a:rPr lang="en-US" sz="1400" kern="1200" dirty="0"/>
-            <a:t>Is a bit complex, a lot of code, might be difficult to implement. It’s something that you design rather in the beginning, it’s hard to refactor.</a:t>
+            <a:t>Use it when it is costly to create new objects from scratch</a:t>
           </a:r>
         </a:p>
       </dsp:txBody>
@@ -10905,8 +10906,8 @@
             <a:buNone/>
           </a:pPr>
           <a:r>
-            <a:rPr lang="en-US" sz="1400" kern="1200" dirty="0"/>
-            <a:t>Think of it as having the same advantages and disadvantages as global variables</a:t>
+            <a:rPr lang="en-US" sz="1400" kern="1200"/>
+            <a:t>Common interface for products, implemented by concrete classes. The client does not know with what kind of product it works.</a:t>
           </a:r>
         </a:p>
       </dsp:txBody>
@@ -11063,8 +11064,8 @@
             <a:buNone/>
           </a:pPr>
           <a:r>
-            <a:rPr lang="en-US" sz="1400" kern="1200" dirty="0"/>
-            <a:t>A lot of developers consider Singleton as an anti pattern</a:t>
+            <a:rPr lang="en-US" sz="1400" kern="1200"/>
+            <a:t>Usually, you have a parameter used to decide which concrete class is going to be instantiated. </a:t>
           </a:r>
         </a:p>
       </dsp:txBody>
@@ -11221,8 +11222,8 @@
             <a:buNone/>
           </a:pPr>
           <a:r>
-            <a:rPr lang="en-US" sz="1400" kern="1200" dirty="0"/>
-            <a:t>Recognize it by identifying a static method to get a resource</a:t>
+            <a:rPr lang="en-US" sz="1400" kern="1200"/>
+            <a:t>If you want to choose the type of a product (object) at runtime, factory is the only one suited for that.</a:t>
           </a:r>
         </a:p>
       </dsp:txBody>
@@ -11379,8 +11380,8 @@
             <a:buNone/>
           </a:pPr>
           <a:r>
-            <a:rPr lang="en-US" sz="1400" kern="1200" dirty="0"/>
-            <a:t>Usages: logging class, manage database connection (or a pool of connections), global state </a:t>
+            <a:rPr lang="en-US" sz="1400" kern="1200"/>
+            <a:t>Any function. It is NOT a class, NOT a constructor, it returns an object.</a:t>
           </a:r>
         </a:p>
       </dsp:txBody>
@@ -11550,7 +11551,7 @@
           </a:pPr>
           <a:r>
             <a:rPr lang="en-US" sz="1400" kern="1200" dirty="0"/>
-            <a:t>All objects that support cloning need to follow the same interface</a:t>
+            <a:t>Solves a specific problem: groups factories. It’s more like a framework. Keyword: family of factories</a:t>
           </a:r>
         </a:p>
       </dsp:txBody>
@@ -11664,7 +11665,7 @@
       </dsp:nvSpPr>
       <dsp:spPr>
         <a:xfrm>
-          <a:off x="910646" y="977153"/>
+          <a:off x="910646" y="987103"/>
           <a:ext cx="3729089" cy="788438"/>
         </a:xfrm>
         <a:prstGeom prst="rect">
@@ -11707,14 +11708,13 @@
             <a:buNone/>
           </a:pPr>
           <a:r>
-            <a:rPr lang="en-US" sz="1400" b="0" i="0" kern="1200" dirty="0"/>
-            <a:t>Clone an object when, at runtime, you need a “true” copy of an object. (the actual copy of the object, with its current values)</a:t>
+            <a:rPr lang="en-US" sz="1400" kern="1200" dirty="0"/>
+            <a:t>Usually, you start with a factory and realize you need a family of products and extend to abstract factory.</a:t>
           </a:r>
-          <a:endParaRPr lang="en-US" sz="1400" kern="1200" dirty="0"/>
         </a:p>
       </dsp:txBody>
       <dsp:txXfrm>
-        <a:off x="910646" y="977153"/>
+        <a:off x="910646" y="987103"/>
         <a:ext cx="3729089" cy="788438"/>
       </dsp:txXfrm>
     </dsp:sp>
@@ -11867,7 +11867,7 @@
           </a:pPr>
           <a:r>
             <a:rPr lang="en-US" sz="1400" kern="1200" dirty="0"/>
-            <a:t>Recognize it “clone” or “copy” method</a:t>
+            <a:t>Recognizable by creational methods returning the factory itself, which in turn can be used to create another abstract/interface type</a:t>
           </a:r>
         </a:p>
       </dsp:txBody>
@@ -12025,7 +12025,7 @@
           </a:pPr>
           <a:r>
             <a:rPr lang="en-US" sz="1400" kern="1200" dirty="0"/>
-            <a:t>Use it when it is costly to create new objects from scratch</a:t>
+            <a:t>Is a bit complex, a lot of code, might be difficult to implement. It’s something that you design rather in the beginning, it’s hard to refactor.</a:t>
           </a:r>
         </a:p>
       </dsp:txBody>
@@ -20601,7 +20601,7 @@
           <a:p>
             <a:fld id="{750E5C3D-F2A1-4895-9BA5-8D88B31E4CA8}" type="datetimeFigureOut">
               <a:rPr lang="en-US" smtClean="0"/>
-              <a:t>2/27/2021</a:t>
+              <a:t>3/4/2021</a:t>
             </a:fld>
             <a:endParaRPr lang="en-US"/>
           </a:p>
@@ -20920,7 +20920,31 @@
                 <a:effectLst/>
                 <a:latin typeface="Roboto"/>
               </a:rPr>
-              <a:t>The essential thing when approaching design patterns is to utilize them in a way that improves our codebase. The above means that we sometimes can bend them to fit our needs. They are commonly associated with object-oriented programming. That doesn’t change the fact that we can take its fundamentals and apply them to something else.</a:t>
+              <a:t>The essential thing when approaching design patterns is to utilize them in a way that improves our codebase. The above means that we sometimes can bend them to fit our needs. </a:t>
+            </a:r>
+          </a:p>
+          <a:p>
+            <a:r>
+              <a:rPr lang="en-US" sz="2800" b="0" i="0" dirty="0">
+                <a:solidFill>
+                  <a:srgbClr val="575757"/>
+                </a:solidFill>
+                <a:effectLst/>
+                <a:latin typeface="Roboto"/>
+              </a:rPr>
+              <a:t>They are commonly associated with object-oriented programming. That doesn’t change the fact that we can take its fundamentals and apply them to something else.</a:t>
+            </a:r>
+          </a:p>
+          <a:p>
+            <a:r>
+              <a:rPr lang="en-US" sz="2800" b="0" i="0" dirty="0">
+                <a:solidFill>
+                  <a:srgbClr val="575757"/>
+                </a:solidFill>
+                <a:effectLst/>
+                <a:latin typeface="Roboto"/>
+              </a:rPr>
+              <a:t>There’s a popular quote: if you have a hammer, everything looks like a nail, it can be a trap.</a:t>
             </a:r>
           </a:p>
           <a:p>
@@ -20997,68 +21021,6 @@
               </a:rPr>
               <a:t>Decorator</a:t>
             </a:r>
-          </a:p>
-          <a:p>
-            <a:r>
-              <a:rPr lang="en-US" sz="1800" dirty="0">
-                <a:effectLst/>
-                <a:latin typeface="Arial" panose="020B0604020202020204" pitchFamily="34" charset="0"/>
-              </a:rPr>
-              <a:t>Daca ai un </a:t>
-            </a:r>
-            <a:r>
-              <a:rPr lang="en-US" sz="1800" dirty="0" err="1">
-                <a:effectLst/>
-                <a:latin typeface="Arial" panose="020B0604020202020204" pitchFamily="34" charset="0"/>
-              </a:rPr>
-              <a:t>ciocan</a:t>
-            </a:r>
-            <a:r>
-              <a:rPr lang="en-US" sz="1800" dirty="0">
-                <a:effectLst/>
-                <a:latin typeface="Arial" panose="020B0604020202020204" pitchFamily="34" charset="0"/>
-              </a:rPr>
-              <a:t>, </a:t>
-            </a:r>
-            <a:r>
-              <a:rPr lang="en-US" sz="1800" dirty="0" err="1">
-                <a:effectLst/>
-                <a:latin typeface="Arial" panose="020B0604020202020204" pitchFamily="34" charset="0"/>
-              </a:rPr>
-              <a:t>totul</a:t>
-            </a:r>
-            <a:r>
-              <a:rPr lang="en-US" sz="1800" dirty="0">
-                <a:effectLst/>
-                <a:latin typeface="Arial" panose="020B0604020202020204" pitchFamily="34" charset="0"/>
-              </a:rPr>
-              <a:t> </a:t>
-            </a:r>
-            <a:r>
-              <a:rPr lang="en-US" sz="1800" dirty="0" err="1">
-                <a:effectLst/>
-                <a:latin typeface="Arial" panose="020B0604020202020204" pitchFamily="34" charset="0"/>
-              </a:rPr>
-              <a:t>arata</a:t>
-            </a:r>
-            <a:r>
-              <a:rPr lang="en-US" sz="1800" dirty="0">
-                <a:effectLst/>
-                <a:latin typeface="Arial" panose="020B0604020202020204" pitchFamily="34" charset="0"/>
-              </a:rPr>
-              <a:t> ca un cui, e o </a:t>
-            </a:r>
-            <a:r>
-              <a:rPr lang="en-US" sz="1800" dirty="0" err="1">
-                <a:effectLst/>
-                <a:latin typeface="Arial" panose="020B0604020202020204" pitchFamily="34" charset="0"/>
-              </a:rPr>
-              <a:t>capcana</a:t>
-            </a:r>
-            <a:endParaRPr lang="en-US" sz="1800" dirty="0">
-              <a:effectLst/>
-              <a:latin typeface="Arial" panose="020B0604020202020204" pitchFamily="34" charset="0"/>
-            </a:endParaRPr>
           </a:p>
           <a:p>
             <a:r>
@@ -22336,7 +22298,61 @@
           <a:bodyPr/>
           <a:lstStyle/>
           <a:p>
-            <a:endParaRPr lang="en-US" dirty="0"/>
+            <a:r>
+              <a:rPr lang="en-US" dirty="0"/>
+              <a:t>The most common and easy to implement pattern.</a:t>
+            </a:r>
+          </a:p>
+          <a:p>
+            <a:pPr marL="0" marR="0" lvl="0" indent="0" algn="l" defTabSz="914400" rtl="0" eaLnBrk="1" fontAlgn="auto" latinLnBrk="0" hangingPunct="1">
+              <a:lnSpc>
+                <a:spcPct val="100000"/>
+              </a:lnSpc>
+              <a:spcBef>
+                <a:spcPts val="0"/>
+              </a:spcBef>
+              <a:spcAft>
+                <a:spcPts val="0"/>
+              </a:spcAft>
+              <a:buClrTx/>
+              <a:buSzTx/>
+              <a:buFontTx/>
+              <a:buNone/>
+              <a:tabLst/>
+              <a:defRPr/>
+            </a:pPr>
+            <a:r>
+              <a:rPr lang="en-US" dirty="0"/>
+              <a:t>Used too much, might slow down your app, becomes a problem if you’re not careful to make it thread safe.</a:t>
+            </a:r>
+          </a:p>
+          <a:p>
+            <a:r>
+              <a:rPr lang="en-US" dirty="0"/>
+              <a:t>Three important characteristics: only one instance, lazy-loading, thread-safe.</a:t>
+            </a:r>
+          </a:p>
+          <a:p>
+            <a:r>
+              <a:rPr lang="en-US" dirty="0"/>
+              <a:t>Lazy loading vs eager loading = load when you actually need something (if null, instantiate) vs </a:t>
+            </a:r>
+            <a:r>
+              <a:rPr lang="en-US" dirty="0" err="1"/>
+              <a:t>init</a:t>
+            </a:r>
+            <a:r>
+              <a:rPr lang="en-US" dirty="0"/>
+              <a:t> resources as soon as code is executed (</a:t>
+            </a:r>
+            <a:r>
+              <a:rPr lang="en-US" dirty="0" err="1"/>
+              <a:t>e.g</a:t>
+            </a:r>
+            <a:r>
+              <a:rPr lang="en-US" dirty="0"/>
+              <a:t> loading at the beginning of website, setup)</a:t>
+            </a:r>
           </a:p>
         </p:txBody>
       </p:sp>
@@ -22357,145 +22373,7 @@
           <a:p>
             <a:fld id="{50111CB6-2A81-414E-BB08-7FFB096CAF31}" type="slidenum">
               <a:rPr lang="en-US" smtClean="0"/>
-              <a:t>10</a:t>
-            </a:fld>
-            <a:endParaRPr lang="en-US"/>
-          </a:p>
-        </p:txBody>
-      </p:sp>
-    </p:spTree>
-    <p:extLst>
-      <p:ext uri="{BB962C8B-B14F-4D97-AF65-F5344CB8AC3E}">
-        <p14:creationId xmlns:p14="http://schemas.microsoft.com/office/powerpoint/2010/main" val="1107812199"/>
-      </p:ext>
-    </p:extLst>
-  </p:cSld>
-  <p:clrMapOvr>
-    <a:masterClrMapping/>
-  </p:clrMapOvr>
-</p:notes>
-</file>
-
-<file path=ppt/notesSlides/notesSlide4.xml><?xml version="1.0" encoding="utf-8"?>
-<p:notes xmlns:a="http://schemas.openxmlformats.org/drawingml/2006/main" xmlns:r="http://schemas.openxmlformats.org/officeDocument/2006/relationships" xmlns:p="http://schemas.openxmlformats.org/presentationml/2006/main">
-  <p:cSld>
-    <p:spTree>
-      <p:nvGrpSpPr>
-        <p:cNvPr id="1" name=""/>
-        <p:cNvGrpSpPr/>
-        <p:nvPr/>
-      </p:nvGrpSpPr>
-      <p:grpSpPr>
-        <a:xfrm>
-          <a:off x="0" y="0"/>
-          <a:ext cx="0" cy="0"/>
-          <a:chOff x="0" y="0"/>
-          <a:chExt cx="0" cy="0"/>
-        </a:xfrm>
-      </p:grpSpPr>
-      <p:sp>
-        <p:nvSpPr>
-          <p:cNvPr id="2" name="Slide Image Placeholder 1"/>
-          <p:cNvSpPr>
-            <a:spLocks noGrp="1" noRot="1" noChangeAspect="1"/>
-          </p:cNvSpPr>
-          <p:nvPr>
-            <p:ph type="sldImg"/>
-          </p:nvPr>
-        </p:nvSpPr>
-        <p:spPr/>
-      </p:sp>
-      <p:sp>
-        <p:nvSpPr>
-          <p:cNvPr id="3" name="Notes Placeholder 2"/>
-          <p:cNvSpPr>
-            <a:spLocks noGrp="1"/>
-          </p:cNvSpPr>
-          <p:nvPr>
-            <p:ph type="body" idx="1"/>
-          </p:nvPr>
-        </p:nvSpPr>
-        <p:spPr/>
-        <p:txBody>
-          <a:bodyPr/>
-          <a:lstStyle/>
-          <a:p>
-            <a:r>
-              <a:rPr lang="en-US" dirty="0"/>
-              <a:t>The most common and easy to implement pattern.</a:t>
-            </a:r>
-          </a:p>
-          <a:p>
-            <a:pPr marL="0" marR="0" lvl="0" indent="0" algn="l" defTabSz="914400" rtl="0" eaLnBrk="1" fontAlgn="auto" latinLnBrk="0" hangingPunct="1">
-              <a:lnSpc>
-                <a:spcPct val="100000"/>
-              </a:lnSpc>
-              <a:spcBef>
-                <a:spcPts val="0"/>
-              </a:spcBef>
-              <a:spcAft>
-                <a:spcPts val="0"/>
-              </a:spcAft>
-              <a:buClrTx/>
-              <a:buSzTx/>
-              <a:buFontTx/>
-              <a:buNone/>
-              <a:tabLst/>
-              <a:defRPr/>
-            </a:pPr>
-            <a:r>
-              <a:rPr lang="en-US" dirty="0"/>
-              <a:t>Used too much, might slow down your app, becomes a problem if you’re not careful to make it thread safe.</a:t>
-            </a:r>
-          </a:p>
-          <a:p>
-            <a:r>
-              <a:rPr lang="en-US" dirty="0"/>
-              <a:t>Three important characteristics: only one instance, lazy-loading, thread-safe.</a:t>
-            </a:r>
-          </a:p>
-          <a:p>
-            <a:r>
-              <a:rPr lang="en-US" dirty="0"/>
-              <a:t>Lazy loading vs eager loading = load when you actually need something (if null, instantiate) vs </a:t>
-            </a:r>
-            <a:r>
-              <a:rPr lang="en-US" dirty="0" err="1"/>
-              <a:t>init</a:t>
-            </a:r>
-            <a:r>
-              <a:rPr lang="en-US" dirty="0"/>
-              <a:t> resources as soon as code is executed (</a:t>
-            </a:r>
-            <a:r>
-              <a:rPr lang="en-US" dirty="0" err="1"/>
-              <a:t>e.g</a:t>
-            </a:r>
-            <a:r>
-              <a:rPr lang="en-US" dirty="0"/>
-              <a:t> loading at the beginning of website, setup)</a:t>
-            </a:r>
-          </a:p>
-        </p:txBody>
-      </p:sp>
-      <p:sp>
-        <p:nvSpPr>
-          <p:cNvPr id="4" name="Slide Number Placeholder 3"/>
-          <p:cNvSpPr>
-            <a:spLocks noGrp="1"/>
-          </p:cNvSpPr>
-          <p:nvPr>
-            <p:ph type="sldNum" sz="quarter" idx="5"/>
-          </p:nvPr>
-        </p:nvSpPr>
-        <p:spPr/>
-        <p:txBody>
-          <a:bodyPr/>
-          <a:lstStyle/>
-          <a:p>
-            <a:fld id="{50111CB6-2A81-414E-BB08-7FFB096CAF31}" type="slidenum">
-              <a:rPr lang="en-US" smtClean="0"/>
-              <a:t>11</a:t>
+              <a:t>5</a:t>
             </a:fld>
             <a:endParaRPr lang="en-US"/>
           </a:p>
@@ -22514,7 +22392,7 @@
 </p:notes>
 </file>
 
-<file path=ppt/notesSlides/notesSlide5.xml><?xml version="1.0" encoding="utf-8"?>
+<file path=ppt/notesSlides/notesSlide4.xml><?xml version="1.0" encoding="utf-8"?>
 <p:notes xmlns:a="http://schemas.openxmlformats.org/drawingml/2006/main" xmlns:r="http://schemas.openxmlformats.org/officeDocument/2006/relationships" xmlns:p="http://schemas.openxmlformats.org/presentationml/2006/main">
   <p:cSld>
     <p:spTree>
@@ -22579,7 +22457,7 @@
           <a:p>
             <a:fld id="{50111CB6-2A81-414E-BB08-7FFB096CAF31}" type="slidenum">
               <a:rPr lang="en-US" smtClean="0"/>
-              <a:t>12</a:t>
+              <a:t>6</a:t>
             </a:fld>
             <a:endParaRPr lang="en-US"/>
           </a:p>
@@ -22589,6 +22467,147 @@
     <p:extLst>
       <p:ext uri="{BB962C8B-B14F-4D97-AF65-F5344CB8AC3E}">
         <p14:creationId xmlns:p14="http://schemas.microsoft.com/office/powerpoint/2010/main" val="1810683592"/>
+      </p:ext>
+    </p:extLst>
+  </p:cSld>
+  <p:clrMapOvr>
+    <a:masterClrMapping/>
+  </p:clrMapOvr>
+</p:notes>
+</file>
+
+<file path=ppt/notesSlides/notesSlide5.xml><?xml version="1.0" encoding="utf-8"?>
+<p:notes xmlns:a="http://schemas.openxmlformats.org/drawingml/2006/main" xmlns:r="http://schemas.openxmlformats.org/officeDocument/2006/relationships" xmlns:p="http://schemas.openxmlformats.org/presentationml/2006/main">
+  <p:cSld>
+    <p:spTree>
+      <p:nvGrpSpPr>
+        <p:cNvPr id="1" name=""/>
+        <p:cNvGrpSpPr/>
+        <p:nvPr/>
+      </p:nvGrpSpPr>
+      <p:grpSpPr>
+        <a:xfrm>
+          <a:off x="0" y="0"/>
+          <a:ext cx="0" cy="0"/>
+          <a:chOff x="0" y="0"/>
+          <a:chExt cx="0" cy="0"/>
+        </a:xfrm>
+      </p:grpSpPr>
+      <p:sp>
+        <p:nvSpPr>
+          <p:cNvPr id="2" name="Slide Image Placeholder 1"/>
+          <p:cNvSpPr>
+            <a:spLocks noGrp="1" noRot="1" noChangeAspect="1"/>
+          </p:cNvSpPr>
+          <p:nvPr>
+            <p:ph type="sldImg"/>
+          </p:nvPr>
+        </p:nvSpPr>
+        <p:spPr/>
+      </p:sp>
+      <p:sp>
+        <p:nvSpPr>
+          <p:cNvPr id="3" name="Notes Placeholder 2"/>
+          <p:cNvSpPr>
+            <a:spLocks noGrp="1"/>
+          </p:cNvSpPr>
+          <p:nvPr>
+            <p:ph type="body" idx="1"/>
+          </p:nvPr>
+        </p:nvSpPr>
+        <p:spPr/>
+        <p:txBody>
+          <a:bodyPr/>
+          <a:lstStyle/>
+          <a:p>
+            <a:r>
+              <a:rPr lang="en-US" dirty="0"/>
+              <a:t>It helps improve object creation costs. </a:t>
+            </a:r>
+          </a:p>
+          <a:p>
+            <a:r>
+              <a:rPr lang="en-US" dirty="0"/>
+              <a:t>You will probably refactor it than implementing at the start of the project. How it’s done, you usually start having performance issues, because it’s costly to create huge objects.</a:t>
+            </a:r>
+          </a:p>
+          <a:p>
+            <a:r>
+              <a:rPr lang="en-US" dirty="0"/>
+              <a:t>No subclasses, it’s an interface. </a:t>
+            </a:r>
+          </a:p>
+          <a:p>
+            <a:r>
+              <a:rPr lang="en-US" dirty="0"/>
+              <a:t>You don’t use “new”, you use clone method</a:t>
+            </a:r>
+          </a:p>
+          <a:p>
+            <a:r>
+              <a:rPr lang="en-US" dirty="0"/>
+              <a:t>Even if it is a copy, each object is a new instance, so it’s not like in the singleton situation.</a:t>
+            </a:r>
+          </a:p>
+          <a:p>
+            <a:r>
+              <a:rPr lang="en-US" dirty="0"/>
+              <a:t>One important concept here: shallow copy vs deep copy.</a:t>
+            </a:r>
+          </a:p>
+          <a:p>
+            <a:r>
+              <a:rPr lang="en-US" dirty="0"/>
+              <a:t>The difference stays in memory location. I make a shallow copy B of object A, B will point to location of A (not for primitive types, obviously). </a:t>
+            </a:r>
+          </a:p>
+          <a:p>
+            <a:r>
+              <a:rPr lang="en-US" dirty="0"/>
+              <a:t>If I change something in A, B will be changed as well.</a:t>
+            </a:r>
+          </a:p>
+          <a:p>
+            <a:r>
+              <a:rPr lang="en-US" dirty="0"/>
+              <a:t>If I make a deep copy, I copy everything from A in B, is like a fresh copy.</a:t>
+            </a:r>
+          </a:p>
+          <a:p>
+            <a:r>
+              <a:rPr lang="en-US" dirty="0"/>
+              <a:t>There are ways of creating deep copies, it’s more costly, it’s complicated, recursive. </a:t>
+            </a:r>
+          </a:p>
+        </p:txBody>
+      </p:sp>
+      <p:sp>
+        <p:nvSpPr>
+          <p:cNvPr id="4" name="Slide Number Placeholder 3"/>
+          <p:cNvSpPr>
+            <a:spLocks noGrp="1"/>
+          </p:cNvSpPr>
+          <p:nvPr>
+            <p:ph type="sldNum" sz="quarter" idx="5"/>
+          </p:nvPr>
+        </p:nvSpPr>
+        <p:spPr/>
+        <p:txBody>
+          <a:bodyPr/>
+          <a:lstStyle/>
+          <a:p>
+            <a:fld id="{50111CB6-2A81-414E-BB08-7FFB096CAF31}" type="slidenum">
+              <a:rPr lang="en-US" smtClean="0"/>
+              <a:t>7</a:t>
+            </a:fld>
+            <a:endParaRPr lang="en-US"/>
+          </a:p>
+        </p:txBody>
+      </p:sp>
+    </p:spTree>
+    <p:extLst>
+      <p:ext uri="{BB962C8B-B14F-4D97-AF65-F5344CB8AC3E}">
+        <p14:creationId xmlns:p14="http://schemas.microsoft.com/office/powerpoint/2010/main" val="1521863286"/>
       </p:ext>
     </p:extLst>
   </p:cSld>
@@ -22642,64 +22661,7 @@
           <a:bodyPr/>
           <a:lstStyle/>
           <a:p>
-            <a:r>
-              <a:rPr lang="en-US" dirty="0"/>
-              <a:t>It helps improve object creation costs. </a:t>
-            </a:r>
-          </a:p>
-          <a:p>
-            <a:r>
-              <a:rPr lang="en-US" dirty="0"/>
-              <a:t>You will probably refactor it than implementing at the start of the project. How it’s done, you usually start having performance issues, because it’s costly to create huge objects.</a:t>
-            </a:r>
-          </a:p>
-          <a:p>
-            <a:r>
-              <a:rPr lang="en-US" dirty="0"/>
-              <a:t>No subclasses, it’s an interface. </a:t>
-            </a:r>
-          </a:p>
-          <a:p>
-            <a:r>
-              <a:rPr lang="en-US" dirty="0"/>
-              <a:t>You don’t use “new”, you use clone method</a:t>
-            </a:r>
-          </a:p>
-          <a:p>
-            <a:r>
-              <a:rPr lang="en-US" dirty="0"/>
-              <a:t>Even if it is a copy, each object is a new instance, so it’s not like in the singleton situation.</a:t>
-            </a:r>
-          </a:p>
-          <a:p>
-            <a:r>
-              <a:rPr lang="en-US" dirty="0"/>
-              <a:t>One important concept here: shallow copy vs deep copy.</a:t>
-            </a:r>
-          </a:p>
-          <a:p>
-            <a:r>
-              <a:rPr lang="en-US" dirty="0"/>
-              <a:t>The difference stays in memory location. I make a shallow copy B of object A, B will point to location of A (not for primitive types, obviously). </a:t>
-            </a:r>
-          </a:p>
-          <a:p>
-            <a:r>
-              <a:rPr lang="en-US" dirty="0"/>
-              <a:t>If I change something in A, B will be changed as well.</a:t>
-            </a:r>
-          </a:p>
-          <a:p>
-            <a:r>
-              <a:rPr lang="en-US" dirty="0"/>
-              <a:t>If I make a deep copy, I copy everything from A in B, is like a fresh copy.</a:t>
-            </a:r>
-          </a:p>
-          <a:p>
-            <a:r>
-              <a:rPr lang="en-US" dirty="0"/>
-              <a:t>There are ways of creating deep copies, it’s more costly, it’s complicated, recursive. </a:t>
-            </a:r>
+            <a:endParaRPr lang="en-US" dirty="0"/>
           </a:p>
         </p:txBody>
       </p:sp>
@@ -22720,7 +22682,7 @@
           <a:p>
             <a:fld id="{50111CB6-2A81-414E-BB08-7FFB096CAF31}" type="slidenum">
               <a:rPr lang="en-US" smtClean="0"/>
-              <a:t>13</a:t>
+              <a:t>8</a:t>
             </a:fld>
             <a:endParaRPr lang="en-US"/>
           </a:p>
@@ -22729,7 +22691,7 @@
     </p:spTree>
     <p:extLst>
       <p:ext uri="{BB962C8B-B14F-4D97-AF65-F5344CB8AC3E}">
-        <p14:creationId xmlns:p14="http://schemas.microsoft.com/office/powerpoint/2010/main" val="1521863286"/>
+        <p14:creationId xmlns:p14="http://schemas.microsoft.com/office/powerpoint/2010/main" val="3755209417"/>
       </p:ext>
     </p:extLst>
   </p:cSld>
@@ -22804,7 +22766,7 @@
           <a:p>
             <a:fld id="{50111CB6-2A81-414E-BB08-7FFB096CAF31}" type="slidenum">
               <a:rPr lang="en-US" smtClean="0"/>
-              <a:t>14</a:t>
+              <a:t>10</a:t>
             </a:fld>
             <a:endParaRPr lang="en-US"/>
           </a:p>
@@ -22813,7 +22775,7 @@
     </p:spTree>
     <p:extLst>
       <p:ext uri="{BB962C8B-B14F-4D97-AF65-F5344CB8AC3E}">
-        <p14:creationId xmlns:p14="http://schemas.microsoft.com/office/powerpoint/2010/main" val="3755209417"/>
+        <p14:creationId xmlns:p14="http://schemas.microsoft.com/office/powerpoint/2010/main" val="1107812199"/>
       </p:ext>
     </p:extLst>
   </p:cSld>
@@ -23067,7 +23029,7 @@
           <a:p>
             <a:fld id="{9184DA70-C731-4C70-880D-CCD4705E623C}" type="datetime1">
               <a:rPr lang="en-US" smtClean="0"/>
-              <a:t>2/27/2021</a:t>
+              <a:t>3/4/2021</a:t>
             </a:fld>
             <a:endParaRPr lang="en-US" dirty="0"/>
           </a:p>
@@ -23255,7 +23217,7 @@
           <a:p>
             <a:fld id="{4BE1D723-8F53-4F53-90B0-1982A396982E}" type="datetime1">
               <a:rPr lang="en-US" smtClean="0"/>
-              <a:t>2/27/2021</a:t>
+              <a:t>3/4/2021</a:t>
             </a:fld>
             <a:endParaRPr lang="en-US" dirty="0"/>
           </a:p>
@@ -23628,7 +23590,7 @@
           <a:p>
             <a:fld id="{97669AF7-7BEB-44E4-9852-375E34362B5B}" type="datetime1">
               <a:rPr lang="en-US" smtClean="0"/>
-              <a:t>2/27/2021</a:t>
+              <a:t>3/4/2021</a:t>
             </a:fld>
             <a:endParaRPr lang="en-US" dirty="0"/>
           </a:p>
@@ -23883,7 +23845,7 @@
           <a:p>
             <a:fld id="{BAAAC38D-0552-4C82-B593-E6124DFADBE2}" type="datetime1">
               <a:rPr lang="en-US" smtClean="0"/>
-              <a:t>2/27/2021</a:t>
+              <a:t>3/4/2021</a:t>
             </a:fld>
             <a:endParaRPr lang="en-US" dirty="0"/>
           </a:p>
@@ -24280,7 +24242,7 @@
           <a:p>
             <a:fld id="{D9DF0F1C-5577-4ACB-BB62-DF8F3C494C7E}" type="datetime1">
               <a:rPr lang="en-US" smtClean="0"/>
-              <a:t>2/27/2021</a:t>
+              <a:t>3/4/2021</a:t>
             </a:fld>
             <a:endParaRPr lang="en-US" dirty="0"/>
           </a:p>
@@ -24416,7 +24378,7 @@
           <a:p>
             <a:fld id="{1775B394-D9F9-4F0C-B15D-605F45CB9E9F}" type="datetime1">
               <a:rPr lang="en-US" smtClean="0"/>
-              <a:t>2/27/2021</a:t>
+              <a:t>3/4/2021</a:t>
             </a:fld>
             <a:endParaRPr lang="en-US" dirty="0"/>
           </a:p>
@@ -24573,7 +24535,7 @@
           <a:p>
             <a:fld id="{39667345-2558-425A-8533-9BFDBCE15005}" type="datetime1">
               <a:rPr lang="en-US" smtClean="0"/>
-              <a:t>2/27/2021</a:t>
+              <a:t>3/4/2021</a:t>
             </a:fld>
             <a:endParaRPr lang="en-US" dirty="0"/>
           </a:p>
@@ -24902,7 +24864,7 @@
           <a:p>
             <a:fld id="{92BEA474-078D-4E9B-9B14-09A87B19DC46}" type="datetime1">
               <a:rPr lang="en-US" smtClean="0"/>
-              <a:t>2/27/2021</a:t>
+              <a:t>3/4/2021</a:t>
             </a:fld>
             <a:endParaRPr lang="en-US" dirty="0"/>
           </a:p>
@@ -25252,7 +25214,7 @@
           <a:p>
             <a:fld id="{4907D986-8816-4272-A432-0437A28A9828}" type="datetime1">
               <a:rPr lang="en-US" smtClean="0"/>
-              <a:t>2/27/2021</a:t>
+              <a:t>3/4/2021</a:t>
             </a:fld>
             <a:endParaRPr lang="en-US" dirty="0"/>
           </a:p>
@@ -25513,7 +25475,7 @@
           <a:p>
             <a:fld id="{62D6E202-B606-4609-B914-27C9371A1F6D}" type="datetime1">
               <a:rPr lang="en-US" smtClean="0"/>
-              <a:t>2/27/2021</a:t>
+              <a:t>3/4/2021</a:t>
             </a:fld>
             <a:endParaRPr lang="en-US" dirty="0"/>
           </a:p>
@@ -26973,6 +26935,52 @@
           </a:p>
         </p:txBody>
       </p:sp>
+      <p:pic>
+        <p:nvPicPr>
+          <p:cNvPr id="1032" name="Picture 8" descr="Image title">
+            <a:extLst>
+              <a:ext uri="{FF2B5EF4-FFF2-40B4-BE49-F238E27FC236}">
+                <a16:creationId xmlns:a16="http://schemas.microsoft.com/office/drawing/2014/main" id="{885DDBD5-ABC5-43A4-9A55-06C8533EE17C}"/>
+              </a:ext>
+            </a:extLst>
+          </p:cNvPr>
+          <p:cNvPicPr>
+            <a:picLocks noChangeAspect="1" noChangeArrowheads="1"/>
+          </p:cNvPicPr>
+          <p:nvPr/>
+        </p:nvPicPr>
+        <p:blipFill>
+          <a:blip r:embed="rId2">
+            <a:extLst>
+              <a:ext uri="{28A0092B-C50C-407E-A947-70E740481C1C}">
+                <a14:useLocalDpi xmlns:a14="http://schemas.microsoft.com/office/drawing/2010/main" val="0"/>
+              </a:ext>
+            </a:extLst>
+          </a:blip>
+          <a:stretch>
+            <a:fillRect/>
+          </a:stretch>
+        </p:blipFill>
+        <p:spPr bwMode="auto">
+          <a:xfrm>
+            <a:off x="3157309" y="643538"/>
+            <a:ext cx="5878481" cy="3557043"/>
+          </a:xfrm>
+          <a:prstGeom prst="rect">
+            <a:avLst/>
+          </a:prstGeom>
+          <a:noFill/>
+          <a:extLst>
+            <a:ext uri="{909E8E84-426E-40DD-AFC4-6F175D3DCCD1}">
+              <a14:hiddenFill xmlns:a14="http://schemas.microsoft.com/office/drawing/2010/main">
+                <a:solidFill>
+                  <a:srgbClr val="FFFFFF"/>
+                </a:solidFill>
+              </a14:hiddenFill>
+            </a:ext>
+          </a:extLst>
+        </p:spPr>
+      </p:pic>
       <p:sp>
         <p:nvSpPr>
           <p:cNvPr id="1037" name="Rectangle 82">
@@ -27059,7 +27067,7 @@
             <a:pPr algn="r"/>
             <a:r>
               <a:rPr lang="en-US" sz="4000" dirty="0"/>
-              <a:t>Singleton</a:t>
+              <a:t>Factory Method</a:t>
             </a:r>
           </a:p>
         </p:txBody>
@@ -27161,7 +27169,7 @@
             </a:r>
             <a:r>
               <a:rPr lang="en-US" dirty="0"/>
-              <a:t>: control access to a shared resource</a:t>
+              <a:t>: many if conditions when creating objects</a:t>
             </a:r>
           </a:p>
           <a:p>
@@ -27182,62 +27190,15 @@
             </a:r>
             <a:r>
               <a:rPr lang="en-US" dirty="0"/>
-              <a:t>: do not allow creation through “new” keyword by having a private constructor + static method to return a cached instance (object)</a:t>
+              <a:t>: usually pass type to a factory method and that method will return the corresponding object using new keyword, as usual</a:t>
             </a:r>
           </a:p>
         </p:txBody>
       </p:sp>
-      <p:pic>
-        <p:nvPicPr>
-          <p:cNvPr id="1026" name="Picture 2" descr="Singleton - Programming in the Large with Design Patterns (2012)">
-            <a:extLst>
-              <a:ext uri="{FF2B5EF4-FFF2-40B4-BE49-F238E27FC236}">
-                <a16:creationId xmlns:a16="http://schemas.microsoft.com/office/drawing/2014/main" id="{43FEF292-E3C0-498A-A9FF-7C41742739E0}"/>
-              </a:ext>
-            </a:extLst>
-          </p:cNvPr>
-          <p:cNvPicPr>
-            <a:picLocks noChangeAspect="1" noChangeArrowheads="1"/>
-          </p:cNvPicPr>
-          <p:nvPr/>
-        </p:nvPicPr>
-        <p:blipFill>
-          <a:blip r:embed="rId3">
-            <a:extLst>
-              <a:ext uri="{28A0092B-C50C-407E-A947-70E740481C1C}">
-                <a14:useLocalDpi xmlns:a14="http://schemas.microsoft.com/office/drawing/2010/main" val="0"/>
-              </a:ext>
-            </a:extLst>
-          </a:blip>
-          <a:srcRect/>
-          <a:stretch>
-            <a:fillRect/>
-          </a:stretch>
-        </p:blipFill>
-        <p:spPr bwMode="auto">
-          <a:xfrm>
-            <a:off x="2881269" y="290528"/>
-            <a:ext cx="6429427" cy="3973851"/>
-          </a:xfrm>
-          <a:prstGeom prst="rect">
-            <a:avLst/>
-          </a:prstGeom>
-          <a:noFill/>
-          <a:extLst>
-            <a:ext uri="{909E8E84-426E-40DD-AFC4-6F175D3DCCD1}">
-              <a14:hiddenFill xmlns:a14="http://schemas.microsoft.com/office/drawing/2010/main">
-                <a:solidFill>
-                  <a:srgbClr val="FFFFFF"/>
-                </a:solidFill>
-              </a14:hiddenFill>
-            </a:ext>
-          </a:extLst>
-        </p:spPr>
-      </p:pic>
     </p:spTree>
     <p:extLst>
       <p:ext uri="{BB962C8B-B14F-4D97-AF65-F5344CB8AC3E}">
-        <p14:creationId xmlns:p14="http://schemas.microsoft.com/office/powerpoint/2010/main" val="2013347428"/>
+        <p14:creationId xmlns:p14="http://schemas.microsoft.com/office/powerpoint/2010/main" val="1329951943"/>
       </p:ext>
     </p:extLst>
   </p:cSld>
@@ -27289,7 +27250,7 @@
           <a:p>
             <a:r>
               <a:rPr lang="en-US" dirty="0"/>
-              <a:t>Singleton in a few words + examples from open-source projects</a:t>
+              <a:t>Factory method in a few words + examples from open-source projects</a:t>
             </a:r>
           </a:p>
         </p:txBody>
@@ -27308,11 +27269,6 @@
           </p:cNvGraphicFramePr>
           <p:nvPr>
             <p:ph sz="half" idx="1"/>
-            <p:extLst>
-              <p:ext uri="{D42A27DB-BD31-4B8C-83A1-F6EECF244321}">
-                <p14:modId xmlns:p14="http://schemas.microsoft.com/office/powerpoint/2010/main" val="3530427464"/>
-              </p:ext>
-            </p:extLst>
           </p:nvPr>
         </p:nvGraphicFramePr>
         <p:xfrm>
@@ -27321,7 +27277,7 @@
         </p:xfrm>
         <a:graphic>
           <a:graphicData uri="http://schemas.openxmlformats.org/drawingml/2006/diagram">
-            <dgm:relIds xmlns:dgm="http://schemas.openxmlformats.org/drawingml/2006/diagram" xmlns:r="http://schemas.openxmlformats.org/officeDocument/2006/relationships" r:dm="rId3" r:lo="rId4" r:qs="rId5" r:cs="rId6"/>
+            <dgm:relIds xmlns:dgm="http://schemas.openxmlformats.org/drawingml/2006/diagram" xmlns:r="http://schemas.openxmlformats.org/officeDocument/2006/relationships" r:dm="rId2" r:lo="rId3" r:qs="rId4" r:cs="rId5"/>
           </a:graphicData>
         </a:graphic>
       </p:graphicFrame>
@@ -27344,64 +27300,96 @@
         <p:spPr/>
         <p:txBody>
           <a:bodyPr>
-            <a:normAutofit fontScale="85000" lnSpcReduction="10000"/>
+            <a:normAutofit fontScale="92500"/>
           </a:bodyPr>
           <a:lstStyle/>
           <a:p>
             <a:r>
               <a:rPr lang="en-US" dirty="0"/>
-              <a:t>JavaScript: ES6 modules</a:t>
+              <a:t>Java: </a:t>
+            </a:r>
+            <a:r>
+              <a:rPr lang="en-US" dirty="0" err="1"/>
+              <a:t>java.util.Calendar</a:t>
+            </a:r>
+            <a:r>
+              <a:rPr lang="en-US" dirty="0"/>
+              <a:t>, </a:t>
+            </a:r>
+            <a:r>
+              <a:rPr lang="en-US" dirty="0" err="1"/>
+              <a:t>ElementBuilderFactory</a:t>
+            </a:r>
+            <a:r>
+              <a:rPr lang="en-US" dirty="0"/>
+              <a:t>, </a:t>
+            </a:r>
+            <a:r>
+              <a:rPr lang="en-US" dirty="0" err="1"/>
+              <a:t>ResourceBundle</a:t>
+            </a:r>
+            <a:r>
+              <a:rPr lang="en-US" dirty="0"/>
+              <a:t>, </a:t>
+            </a:r>
+            <a:r>
+              <a:rPr lang="en-US" dirty="0" err="1"/>
+              <a:t>NumberFormat</a:t>
+            </a:r>
+            <a:r>
+              <a:rPr lang="en-US" dirty="0"/>
+              <a:t>, </a:t>
+            </a:r>
+            <a:r>
+              <a:rPr lang="en-US" dirty="0" err="1"/>
+              <a:t>BeanFactory</a:t>
+            </a:r>
+            <a:r>
+              <a:rPr lang="en-US" dirty="0"/>
+              <a:t> Spring, </a:t>
+            </a:r>
+            <a:r>
+              <a:rPr lang="en-US" dirty="0" err="1"/>
+              <a:t>ThreadFactory</a:t>
+            </a:r>
+            <a:r>
+              <a:rPr lang="en-US" dirty="0"/>
+              <a:t>, Signature, </a:t>
             </a:r>
           </a:p>
           <a:p>
             <a:r>
-              <a:rPr lang="en-US" dirty="0">
-                <a:hlinkClick r:id="rId8"/>
-              </a:rPr>
-              <a:t>https://codesandbox.io/s/es6-singletons-gwrv3</a:t>
+              <a:rPr lang="en-US" dirty="0"/>
+              <a:t>Android: </a:t>
+            </a:r>
+            <a:r>
+              <a:rPr lang="en-US" dirty="0" err="1"/>
+              <a:t>Android.Graphic.Drawables</a:t>
             </a:r>
             <a:endParaRPr lang="en-US" dirty="0"/>
           </a:p>
           <a:p>
             <a:r>
               <a:rPr lang="en-US" dirty="0"/>
-              <a:t>Firebase: </a:t>
+              <a:t>JavaScript: Factory for creating UI components </a:t>
             </a:r>
             <a:r>
               <a:rPr lang="en-US" dirty="0">
-                <a:hlinkClick r:id="rId9"/>
+                <a:hlinkClick r:id="rId7"/>
               </a:rPr>
-              <a:t>https://firebase.google.com/docs/reference/android/com/google/firebase/auth/FirebaseAuth</a:t>
+              <a:t>https://github.com/FrontendMatter/dom-factory</a:t>
             </a:r>
             <a:endParaRPr lang="en-US" dirty="0"/>
           </a:p>
           <a:p>
             <a:r>
+              <a:rPr lang="en-US" dirty="0" err="1"/>
+              <a:t>React.DOM</a:t>
+            </a:r>
+            <a:r>
               <a:rPr lang="en-US" dirty="0"/>
-              <a:t>Java: </a:t>
-            </a:r>
-            <a:r>
-              <a:rPr lang="en-US" dirty="0">
-                <a:hlinkClick r:id="rId10"/>
-              </a:rPr>
-              <a:t>https://docs.oracle.com/javase/8/docs/api/java/lang/System.html#getSecurityManager--</a:t>
-            </a:r>
-            <a:endParaRPr lang="en-US" dirty="0"/>
-          </a:p>
-          <a:p>
-            <a:r>
-              <a:rPr lang="en-US" dirty="0"/>
-              <a:t>Redux: the state tree from redux </a:t>
-            </a:r>
-          </a:p>
-          <a:p>
-            <a:r>
-              <a:rPr lang="en-US" dirty="0">
-                <a:hlinkClick r:id="rId11"/>
-              </a:rPr>
-              <a:t>https://redux.js.org/understanding/thinking-in-redux/three-principles</a:t>
-            </a:r>
-            <a:endParaRPr lang="en-US" dirty="0"/>
+              <a:t> for creating elements (when you don’t use JSX)</a:t>
+            </a:r>
           </a:p>
           <a:p>
             <a:endParaRPr lang="en-US" dirty="0"/>
@@ -27518,7 +27506,7 @@
     </p:spTree>
     <p:extLst>
       <p:ext uri="{BB962C8B-B14F-4D97-AF65-F5344CB8AC3E}">
-        <p14:creationId xmlns:p14="http://schemas.microsoft.com/office/powerpoint/2010/main" val="3422614106"/>
+        <p14:creationId xmlns:p14="http://schemas.microsoft.com/office/powerpoint/2010/main" val="934832831"/>
       </p:ext>
     </p:extLst>
   </p:cSld>
@@ -27809,14 +27797,7 @@
             <a:pPr algn="r"/>
             <a:r>
               <a:rPr lang="en-US" sz="4000" dirty="0"/>
-              <a:t>Prototype</a:t>
-            </a:r>
-            <a:br>
-              <a:rPr lang="en-US" sz="4000" dirty="0"/>
-            </a:br>
-            <a:r>
-              <a:rPr lang="en-US" sz="1600" dirty="0"/>
-              <a:t>*a prototype is an object that supports cloning</a:t>
+              <a:t>Abstract Factory</a:t>
             </a:r>
           </a:p>
         </p:txBody>
@@ -27918,7 +27899,7 @@
             </a:r>
             <a:r>
               <a:rPr lang="en-US" dirty="0"/>
-              <a:t>: you need objects with the same structure (same fields, methods, event private ones)</a:t>
+              <a:t>: you have a family of related products (objects) and you need a lot of conditionals</a:t>
             </a:r>
           </a:p>
           <a:p>
@@ -27939,17 +27920,17 @@
             </a:r>
             <a:r>
               <a:rPr lang="en-US" dirty="0"/>
-              <a:t>: have a common interface for all objects that supports cloning, each object being responsible to return a copy through a “clone” method</a:t>
+              <a:t>: factory of factories, adds an abstraction layer on factory, using composition (car has an engine, has a door etc.)</a:t>
             </a:r>
           </a:p>
         </p:txBody>
       </p:sp>
       <p:pic>
         <p:nvPicPr>
-          <p:cNvPr id="2050" name="Picture 2" descr="Prototype Pattern in Java | Baeldung">
+          <p:cNvPr id="3074" name="Picture 2" descr="UML class diagram example for the Abstract Factory Design Pattern.">
             <a:extLst>
               <a:ext uri="{FF2B5EF4-FFF2-40B4-BE49-F238E27FC236}">
-                <a16:creationId xmlns:a16="http://schemas.microsoft.com/office/drawing/2014/main" id="{CE50C3B8-A2FC-4FB9-88FA-2B1C6B8AEC51}"/>
+                <a16:creationId xmlns:a16="http://schemas.microsoft.com/office/drawing/2014/main" id="{0E0B90EC-AB6A-49D9-B4EA-CA2EE74D3421}"/>
               </a:ext>
             </a:extLst>
           </p:cNvPr>
@@ -27959,7 +27940,7 @@
           <p:nvPr/>
         </p:nvPicPr>
         <p:blipFill>
-          <a:blip r:embed="rId3">
+          <a:blip r:embed="rId2">
             <a:extLst>
               <a:ext uri="{28A0092B-C50C-407E-A947-70E740481C1C}">
                 <a14:useLocalDpi xmlns:a14="http://schemas.microsoft.com/office/drawing/2010/main" val="0"/>
@@ -27973,8 +27954,8 @@
         </p:blipFill>
         <p:spPr bwMode="auto">
           <a:xfrm>
-            <a:off x="2691725" y="686221"/>
-            <a:ext cx="6808549" cy="3233745"/>
+            <a:off x="1833612" y="181953"/>
+            <a:ext cx="8686800" cy="4191000"/>
           </a:xfrm>
           <a:prstGeom prst="rect">
             <a:avLst/>
@@ -27994,7 +27975,7 @@
     </p:spTree>
     <p:extLst>
       <p:ext uri="{BB962C8B-B14F-4D97-AF65-F5344CB8AC3E}">
-        <p14:creationId xmlns:p14="http://schemas.microsoft.com/office/powerpoint/2010/main" val="83257071"/>
+        <p14:creationId xmlns:p14="http://schemas.microsoft.com/office/powerpoint/2010/main" val="1170359359"/>
       </p:ext>
     </p:extLst>
   </p:cSld>
@@ -28046,7 +28027,7 @@
           <a:p>
             <a:r>
               <a:rPr lang="en-US" dirty="0"/>
-              <a:t>Prototype in a few words + examples from open-source projects</a:t>
+              <a:t>Abstract Factory in a few words + examples from open-source projects</a:t>
             </a:r>
           </a:p>
         </p:txBody>
@@ -28067,7 +28048,7 @@
             <p:ph sz="half" idx="1"/>
             <p:extLst>
               <p:ext uri="{D42A27DB-BD31-4B8C-83A1-F6EECF244321}">
-                <p14:modId xmlns:p14="http://schemas.microsoft.com/office/powerpoint/2010/main" val="579790988"/>
+                <p14:modId xmlns:p14="http://schemas.microsoft.com/office/powerpoint/2010/main" val="2690223190"/>
               </p:ext>
             </p:extLst>
           </p:nvPr>
@@ -28078,7 +28059,7 @@
         </p:xfrm>
         <a:graphic>
           <a:graphicData uri="http://schemas.openxmlformats.org/drawingml/2006/diagram">
-            <dgm:relIds xmlns:dgm="http://schemas.openxmlformats.org/drawingml/2006/diagram" xmlns:r="http://schemas.openxmlformats.org/officeDocument/2006/relationships" r:dm="rId3" r:lo="rId4" r:qs="rId5" r:cs="rId6"/>
+            <dgm:relIds xmlns:dgm="http://schemas.openxmlformats.org/drawingml/2006/diagram" xmlns:r="http://schemas.openxmlformats.org/officeDocument/2006/relationships" r:dm="rId2" r:lo="rId3" r:qs="rId4" r:cs="rId5"/>
           </a:graphicData>
         </a:graphic>
       </p:graphicFrame>
@@ -28101,65 +28082,101 @@
         <p:spPr/>
         <p:txBody>
           <a:bodyPr>
-            <a:normAutofit fontScale="85000" lnSpcReduction="10000"/>
+            <a:normAutofit/>
           </a:bodyPr>
           <a:lstStyle/>
           <a:p>
             <a:r>
               <a:rPr lang="en-US" dirty="0"/>
-              <a:t>JavaScript: prototype inheritance</a:t>
-            </a:r>
+              <a:t>Java: JDBC API, </a:t>
+            </a:r>
+            <a:r>
+              <a:rPr lang="en-US" dirty="0" err="1"/>
+              <a:t>DocumentBuilderFactory</a:t>
+            </a:r>
+            <a:r>
+              <a:rPr lang="en-US" dirty="0"/>
+              <a:t>, </a:t>
+            </a:r>
+            <a:r>
+              <a:rPr lang="en-US" dirty="0" err="1"/>
+              <a:t>TransformerFactory</a:t>
+            </a:r>
+            <a:r>
+              <a:rPr lang="en-US" dirty="0"/>
+              <a:t>, </a:t>
+            </a:r>
+            <a:r>
+              <a:rPr lang="en-US" dirty="0" err="1"/>
+              <a:t>XPathFactory</a:t>
+            </a:r>
+            <a:endParaRPr lang="en-US" dirty="0"/>
           </a:p>
           <a:p>
+            <a:pPr marL="0" indent="0">
+              <a:buNone/>
+            </a:pPr>
+            <a:r>
+              <a:rPr lang="en-US" dirty="0"/>
+              <a:t>.NET: </a:t>
+            </a:r>
+            <a:r>
+              <a:rPr lang="en-US" dirty="0" err="1"/>
+              <a:t>DbProviderFactory</a:t>
+            </a:r>
+            <a:r>
+              <a:rPr lang="en-US" dirty="0"/>
+              <a:t> class</a:t>
+            </a:r>
+          </a:p>
+          <a:p>
+            <a:pPr marL="0" indent="0">
+              <a:buNone/>
+            </a:pPr>
+            <a:r>
+              <a:rPr lang="en-US" dirty="0">
+                <a:hlinkClick r:id="rId7"/>
+              </a:rPr>
+              <a:t>https://docs.microsoft.com/en-us/dotnet/api/system.data.common.dbproviderfactory?view=net-5.0</a:t>
+            </a:r>
+            <a:endParaRPr lang="en-US" dirty="0"/>
+          </a:p>
+          <a:p>
+            <a:pPr marL="0" indent="0">
+              <a:buNone/>
+            </a:pPr>
+            <a:r>
+              <a:rPr lang="en-US" dirty="0"/>
+              <a:t>Python: </a:t>
+            </a:r>
+            <a:r>
+              <a:rPr lang="en-US" dirty="0" err="1"/>
+              <a:t>factory_boy</a:t>
+            </a:r>
+            <a:r>
+              <a:rPr lang="en-US" dirty="0"/>
+              <a:t> </a:t>
+            </a:r>
+          </a:p>
+          <a:p>
+            <a:pPr marL="0" indent="0">
+              <a:buNone/>
+            </a:pPr>
             <a:r>
               <a:rPr lang="en-US" dirty="0">
                 <a:hlinkClick r:id="rId8"/>
               </a:rPr>
-              <a:t>https://repl.it/@khaled_hossain_code/prototype</a:t>
+              <a:t>https://factoryboy.readthedocs.io/en/stable/index.html</a:t>
             </a:r>
             <a:endParaRPr lang="en-US" dirty="0"/>
           </a:p>
           <a:p>
-            <a:r>
-              <a:rPr lang="en-US" dirty="0"/>
-              <a:t>Java: </a:t>
-            </a:r>
-            <a:r>
-              <a:rPr lang="en-US" dirty="0">
-                <a:hlinkClick r:id="rId9"/>
-              </a:rPr>
-              <a:t>https://docs.oracle.com/javase/8/docs/api/java/lang/Cloneable.html</a:t>
-            </a:r>
+            <a:pPr marL="0" indent="0">
+              <a:buNone/>
+            </a:pPr>
             <a:endParaRPr lang="en-US" dirty="0"/>
           </a:p>
           <a:p>
-            <a:r>
-              <a:rPr lang="en-US" dirty="0"/>
-              <a:t>C#: </a:t>
-            </a:r>
-          </a:p>
-          <a:p>
-            <a:r>
-              <a:rPr lang="en-US" dirty="0">
-                <a:hlinkClick r:id="rId10"/>
-              </a:rPr>
-              <a:t>https://docs.microsoft.com/en-us/dotnet/api/system.icloneable?view=net-5.0</a:t>
-            </a:r>
-            <a:endParaRPr lang="en-US" dirty="0"/>
-          </a:p>
-          <a:p>
-            <a:r>
-              <a:rPr lang="en-US" dirty="0"/>
-              <a:t>Python: copy module </a:t>
-            </a:r>
-          </a:p>
-          <a:p>
-            <a:r>
-              <a:rPr lang="en-US" dirty="0">
-                <a:hlinkClick r:id="rId11"/>
-              </a:rPr>
-              <a:t>https://docs.python.org/2/library/copy.html</a:t>
-            </a:r>
             <a:endParaRPr lang="en-US" dirty="0"/>
           </a:p>
         </p:txBody>
@@ -28274,7 +28291,7 @@
     </p:spTree>
     <p:extLst>
       <p:ext uri="{BB962C8B-B14F-4D97-AF65-F5344CB8AC3E}">
-        <p14:creationId xmlns:p14="http://schemas.microsoft.com/office/powerpoint/2010/main" val="3250782400"/>
+        <p14:creationId xmlns:p14="http://schemas.microsoft.com/office/powerpoint/2010/main" val="158230169"/>
       </p:ext>
     </p:extLst>
   </p:cSld>
@@ -29648,52 +29665,6 @@
           </a:p>
         </p:txBody>
       </p:sp>
-      <p:pic>
-        <p:nvPicPr>
-          <p:cNvPr id="1032" name="Picture 8" descr="Image title">
-            <a:extLst>
-              <a:ext uri="{FF2B5EF4-FFF2-40B4-BE49-F238E27FC236}">
-                <a16:creationId xmlns:a16="http://schemas.microsoft.com/office/drawing/2014/main" id="{885DDBD5-ABC5-43A4-9A55-06C8533EE17C}"/>
-              </a:ext>
-            </a:extLst>
-          </p:cNvPr>
-          <p:cNvPicPr>
-            <a:picLocks noChangeAspect="1" noChangeArrowheads="1"/>
-          </p:cNvPicPr>
-          <p:nvPr/>
-        </p:nvPicPr>
-        <p:blipFill>
-          <a:blip r:embed="rId2">
-            <a:extLst>
-              <a:ext uri="{28A0092B-C50C-407E-A947-70E740481C1C}">
-                <a14:useLocalDpi xmlns:a14="http://schemas.microsoft.com/office/drawing/2010/main" val="0"/>
-              </a:ext>
-            </a:extLst>
-          </a:blip>
-          <a:stretch>
-            <a:fillRect/>
-          </a:stretch>
-        </p:blipFill>
-        <p:spPr bwMode="auto">
-          <a:xfrm>
-            <a:off x="3157309" y="643538"/>
-            <a:ext cx="5878481" cy="3557043"/>
-          </a:xfrm>
-          <a:prstGeom prst="rect">
-            <a:avLst/>
-          </a:prstGeom>
-          <a:noFill/>
-          <a:extLst>
-            <a:ext uri="{909E8E84-426E-40DD-AFC4-6F175D3DCCD1}">
-              <a14:hiddenFill xmlns:a14="http://schemas.microsoft.com/office/drawing/2010/main">
-                <a:solidFill>
-                  <a:srgbClr val="FFFFFF"/>
-                </a:solidFill>
-              </a14:hiddenFill>
-            </a:ext>
-          </a:extLst>
-        </p:spPr>
-      </p:pic>
       <p:sp>
         <p:nvSpPr>
           <p:cNvPr id="1037" name="Rectangle 82">
@@ -29780,7 +29751,7 @@
             <a:pPr algn="r"/>
             <a:r>
               <a:rPr lang="en-US" sz="4000" dirty="0"/>
-              <a:t>Factory Method</a:t>
+              <a:t>Singleton</a:t>
             </a:r>
           </a:p>
         </p:txBody>
@@ -29882,7 +29853,7 @@
             </a:r>
             <a:r>
               <a:rPr lang="en-US" dirty="0"/>
-              <a:t>: many if conditions when creating objects</a:t>
+              <a:t>: control access to a shared resource</a:t>
             </a:r>
           </a:p>
           <a:p>
@@ -29903,15 +29874,62 @@
             </a:r>
             <a:r>
               <a:rPr lang="en-US" dirty="0"/>
-              <a:t>: usually pass type to a factory method and that method will return the corresponding object using new keyword, as usual</a:t>
+              <a:t>: do not allow creation through “new” keyword by having a private constructor + static method to return a cached instance (object)</a:t>
             </a:r>
           </a:p>
         </p:txBody>
       </p:sp>
+      <p:pic>
+        <p:nvPicPr>
+          <p:cNvPr id="1026" name="Picture 2" descr="Singleton - Programming in the Large with Design Patterns (2012)">
+            <a:extLst>
+              <a:ext uri="{FF2B5EF4-FFF2-40B4-BE49-F238E27FC236}">
+                <a16:creationId xmlns:a16="http://schemas.microsoft.com/office/drawing/2014/main" id="{43FEF292-E3C0-498A-A9FF-7C41742739E0}"/>
+              </a:ext>
+            </a:extLst>
+          </p:cNvPr>
+          <p:cNvPicPr>
+            <a:picLocks noChangeAspect="1" noChangeArrowheads="1"/>
+          </p:cNvPicPr>
+          <p:nvPr/>
+        </p:nvPicPr>
+        <p:blipFill>
+          <a:blip r:embed="rId3">
+            <a:extLst>
+              <a:ext uri="{28A0092B-C50C-407E-A947-70E740481C1C}">
+                <a14:useLocalDpi xmlns:a14="http://schemas.microsoft.com/office/drawing/2010/main" val="0"/>
+              </a:ext>
+            </a:extLst>
+          </a:blip>
+          <a:srcRect/>
+          <a:stretch>
+            <a:fillRect/>
+          </a:stretch>
+        </p:blipFill>
+        <p:spPr bwMode="auto">
+          <a:xfrm>
+            <a:off x="2881269" y="290528"/>
+            <a:ext cx="6429427" cy="3973851"/>
+          </a:xfrm>
+          <a:prstGeom prst="rect">
+            <a:avLst/>
+          </a:prstGeom>
+          <a:noFill/>
+          <a:extLst>
+            <a:ext uri="{909E8E84-426E-40DD-AFC4-6F175D3DCCD1}">
+              <a14:hiddenFill xmlns:a14="http://schemas.microsoft.com/office/drawing/2010/main">
+                <a:solidFill>
+                  <a:srgbClr val="FFFFFF"/>
+                </a:solidFill>
+              </a14:hiddenFill>
+            </a:ext>
+          </a:extLst>
+        </p:spPr>
+      </p:pic>
     </p:spTree>
     <p:extLst>
       <p:ext uri="{BB962C8B-B14F-4D97-AF65-F5344CB8AC3E}">
-        <p14:creationId xmlns:p14="http://schemas.microsoft.com/office/powerpoint/2010/main" val="1329951943"/>
+        <p14:creationId xmlns:p14="http://schemas.microsoft.com/office/powerpoint/2010/main" val="2013347428"/>
       </p:ext>
     </p:extLst>
   </p:cSld>
@@ -29963,7 +29981,7 @@
           <a:p>
             <a:r>
               <a:rPr lang="en-US" dirty="0"/>
-              <a:t>Factory method in a few words + examples from open-source projects</a:t>
+              <a:t>Singleton in a few words + examples from open-source projects</a:t>
             </a:r>
           </a:p>
         </p:txBody>
@@ -29982,6 +30000,11 @@
           </p:cNvGraphicFramePr>
           <p:nvPr>
             <p:ph sz="half" idx="1"/>
+            <p:extLst>
+              <p:ext uri="{D42A27DB-BD31-4B8C-83A1-F6EECF244321}">
+                <p14:modId xmlns:p14="http://schemas.microsoft.com/office/powerpoint/2010/main" val="3530427464"/>
+              </p:ext>
+            </p:extLst>
           </p:nvPr>
         </p:nvGraphicFramePr>
         <p:xfrm>
@@ -29990,7 +30013,7 @@
         </p:xfrm>
         <a:graphic>
           <a:graphicData uri="http://schemas.openxmlformats.org/drawingml/2006/diagram">
-            <dgm:relIds xmlns:dgm="http://schemas.openxmlformats.org/drawingml/2006/diagram" xmlns:r="http://schemas.openxmlformats.org/officeDocument/2006/relationships" r:dm="rId2" r:lo="rId3" r:qs="rId4" r:cs="rId5"/>
+            <dgm:relIds xmlns:dgm="http://schemas.openxmlformats.org/drawingml/2006/diagram" xmlns:r="http://schemas.openxmlformats.org/officeDocument/2006/relationships" r:dm="rId3" r:lo="rId4" r:qs="rId5" r:cs="rId6"/>
           </a:graphicData>
         </a:graphic>
       </p:graphicFrame>
@@ -30010,99 +30033,75 @@
             <p:ph sz="half" idx="2"/>
           </p:nvPr>
         </p:nvSpPr>
-        <p:spPr/>
+        <p:spPr>
+          <a:xfrm>
+            <a:off x="6515944" y="2120899"/>
+            <a:ext cx="4639736" cy="3890433"/>
+          </a:xfrm>
+        </p:spPr>
         <p:txBody>
           <a:bodyPr>
-            <a:normAutofit fontScale="92500"/>
+            <a:normAutofit fontScale="85000" lnSpcReduction="10000"/>
           </a:bodyPr>
           <a:lstStyle/>
           <a:p>
             <a:r>
               <a:rPr lang="en-US" dirty="0"/>
-              <a:t>Java: </a:t>
-            </a:r>
-            <a:r>
-              <a:rPr lang="en-US" dirty="0" err="1"/>
-              <a:t>java.util.Calendar</a:t>
-            </a:r>
-            <a:r>
-              <a:rPr lang="en-US" dirty="0"/>
-              <a:t>, </a:t>
-            </a:r>
-            <a:r>
-              <a:rPr lang="en-US" dirty="0" err="1"/>
-              <a:t>ElementBuilderFactory</a:t>
-            </a:r>
-            <a:r>
-              <a:rPr lang="en-US" dirty="0"/>
-              <a:t>, </a:t>
-            </a:r>
-            <a:r>
-              <a:rPr lang="en-US" dirty="0" err="1"/>
-              <a:t>ResourceBundle</a:t>
-            </a:r>
-            <a:r>
-              <a:rPr lang="en-US" dirty="0"/>
-              <a:t>, </a:t>
-            </a:r>
-            <a:r>
-              <a:rPr lang="en-US" dirty="0" err="1"/>
-              <a:t>NumberFormat</a:t>
-            </a:r>
-            <a:r>
-              <a:rPr lang="en-US" dirty="0"/>
-              <a:t>, </a:t>
-            </a:r>
-            <a:r>
-              <a:rPr lang="en-US" dirty="0" err="1"/>
-              <a:t>BeanFactory</a:t>
-            </a:r>
-            <a:r>
-              <a:rPr lang="en-US" dirty="0"/>
-              <a:t> Spring, </a:t>
-            </a:r>
-            <a:r>
-              <a:rPr lang="en-US" dirty="0" err="1"/>
-              <a:t>ThreadFactory</a:t>
-            </a:r>
-            <a:r>
-              <a:rPr lang="en-US" dirty="0"/>
-              <a:t>, Signature, </a:t>
+              <a:t>JavaScript: ES6 modules</a:t>
             </a:r>
           </a:p>
           <a:p>
             <a:r>
-              <a:rPr lang="en-US" dirty="0"/>
-              <a:t>Android: </a:t>
-            </a:r>
-            <a:r>
-              <a:rPr lang="en-US" dirty="0" err="1"/>
-              <a:t>Android.Graphic.Drawables</a:t>
+              <a:rPr lang="en-US" dirty="0">
+                <a:hlinkClick r:id="rId8"/>
+              </a:rPr>
+              <a:t>https://codesandbox.io/s/es6-singletons-gwrv3</a:t>
             </a:r>
             <a:endParaRPr lang="en-US" dirty="0"/>
           </a:p>
           <a:p>
             <a:r>
               <a:rPr lang="en-US" dirty="0"/>
-              <a:t>JavaScript: Factory for creating UI components </a:t>
+              <a:t>Firebase: </a:t>
             </a:r>
             <a:r>
               <a:rPr lang="en-US" dirty="0">
-                <a:hlinkClick r:id="rId7"/>
+                <a:hlinkClick r:id="rId9"/>
               </a:rPr>
-              <a:t>https://github.com/FrontendMatter/dom-factory</a:t>
+              <a:t>https://firebase.google.com/docs/reference/android/com/google/firebase/auth/FirebaseAuth</a:t>
             </a:r>
             <a:endParaRPr lang="en-US" dirty="0"/>
           </a:p>
           <a:p>
             <a:r>
-              <a:rPr lang="en-US" dirty="0" err="1"/>
-              <a:t>React.DOM</a:t>
-            </a:r>
-            <a:r>
               <a:rPr lang="en-US" dirty="0"/>
-              <a:t> for creating elements (when you don’t use JSX)</a:t>
-            </a:r>
+              <a:t>Java: </a:t>
+            </a:r>
+            <a:r>
+              <a:rPr lang="en-US" dirty="0">
+                <a:hlinkClick r:id="rId10"/>
+              </a:rPr>
+              <a:t>https://docs.oracle.com/javase/8/docs/api/java/lang/System.html#getSecurityManager--</a:t>
+            </a:r>
+            <a:endParaRPr lang="en-US" dirty="0"/>
+          </a:p>
+          <a:p>
+            <a:r>
+              <a:rPr lang="en-US" dirty="0"/>
+              <a:t>Redux: the state tree from redux </a:t>
+            </a:r>
+          </a:p>
+          <a:p>
+            <a:r>
+              <a:rPr lang="en-US" dirty="0">
+                <a:hlinkClick r:id="rId11"/>
+              </a:rPr>
+              <a:t>https://redux.js.org/understanding/thinking-in-redux/three-principles</a:t>
+            </a:r>
+            <a:endParaRPr lang="en-US" dirty="0"/>
+          </a:p>
+          <a:p>
+            <a:endParaRPr lang="en-US" dirty="0"/>
           </a:p>
           <a:p>
             <a:endParaRPr lang="en-US" dirty="0"/>
@@ -30219,7 +30218,7 @@
     </p:spTree>
     <p:extLst>
       <p:ext uri="{BB962C8B-B14F-4D97-AF65-F5344CB8AC3E}">
-        <p14:creationId xmlns:p14="http://schemas.microsoft.com/office/powerpoint/2010/main" val="934832831"/>
+        <p14:creationId xmlns:p14="http://schemas.microsoft.com/office/powerpoint/2010/main" val="3422614106"/>
       </p:ext>
     </p:extLst>
   </p:cSld>
@@ -30510,7 +30509,14 @@
             <a:pPr algn="r"/>
             <a:r>
               <a:rPr lang="en-US" sz="4000" dirty="0"/>
-              <a:t>Abstract Factory</a:t>
+              <a:t>Prototype</a:t>
+            </a:r>
+            <a:br>
+              <a:rPr lang="en-US" sz="4000" dirty="0"/>
+            </a:br>
+            <a:r>
+              <a:rPr lang="en-US" sz="1600" dirty="0"/>
+              <a:t>*a prototype is an object that supports cloning</a:t>
             </a:r>
           </a:p>
         </p:txBody>
@@ -30612,7 +30618,7 @@
             </a:r>
             <a:r>
               <a:rPr lang="en-US" dirty="0"/>
-              <a:t>: you have a family of related products (objects) and you need a lot of conditionals</a:t>
+              <a:t>: you need objects with the same structure (same fields, methods, event private ones)</a:t>
             </a:r>
           </a:p>
           <a:p>
@@ -30633,17 +30639,17 @@
             </a:r>
             <a:r>
               <a:rPr lang="en-US" dirty="0"/>
-              <a:t>: factory of factories, adds an abstraction layer on factory, using composition (car has an engine, has a door etc.)</a:t>
+              <a:t>: have a common interface for all objects that supports cloning, each object being responsible to return a copy through a “clone” method</a:t>
             </a:r>
           </a:p>
         </p:txBody>
       </p:sp>
       <p:pic>
         <p:nvPicPr>
-          <p:cNvPr id="3074" name="Picture 2" descr="UML class diagram example for the Abstract Factory Design Pattern.">
+          <p:cNvPr id="2050" name="Picture 2" descr="Prototype Pattern in Java | Baeldung">
             <a:extLst>
               <a:ext uri="{FF2B5EF4-FFF2-40B4-BE49-F238E27FC236}">
-                <a16:creationId xmlns:a16="http://schemas.microsoft.com/office/drawing/2014/main" id="{0E0B90EC-AB6A-49D9-B4EA-CA2EE74D3421}"/>
+                <a16:creationId xmlns:a16="http://schemas.microsoft.com/office/drawing/2014/main" id="{CE50C3B8-A2FC-4FB9-88FA-2B1C6B8AEC51}"/>
               </a:ext>
             </a:extLst>
           </p:cNvPr>
@@ -30653,7 +30659,7 @@
           <p:nvPr/>
         </p:nvPicPr>
         <p:blipFill>
-          <a:blip r:embed="rId2">
+          <a:blip r:embed="rId3">
             <a:extLst>
               <a:ext uri="{28A0092B-C50C-407E-A947-70E740481C1C}">
                 <a14:useLocalDpi xmlns:a14="http://schemas.microsoft.com/office/drawing/2010/main" val="0"/>
@@ -30667,8 +30673,8 @@
         </p:blipFill>
         <p:spPr bwMode="auto">
           <a:xfrm>
-            <a:off x="1833612" y="181953"/>
-            <a:ext cx="8686800" cy="4191000"/>
+            <a:off x="2691725" y="686221"/>
+            <a:ext cx="6808549" cy="3233745"/>
           </a:xfrm>
           <a:prstGeom prst="rect">
             <a:avLst/>
@@ -30688,7 +30694,7 @@
     </p:spTree>
     <p:extLst>
       <p:ext uri="{BB962C8B-B14F-4D97-AF65-F5344CB8AC3E}">
-        <p14:creationId xmlns:p14="http://schemas.microsoft.com/office/powerpoint/2010/main" val="1170359359"/>
+        <p14:creationId xmlns:p14="http://schemas.microsoft.com/office/powerpoint/2010/main" val="83257071"/>
       </p:ext>
     </p:extLst>
   </p:cSld>
@@ -30740,7 +30746,7 @@
           <a:p>
             <a:r>
               <a:rPr lang="en-US" dirty="0"/>
-              <a:t>Abstract Factory in a few words + examples from open-source projects</a:t>
+              <a:t>Prototype in a few words + examples from open-source projects</a:t>
             </a:r>
           </a:p>
         </p:txBody>
@@ -30761,7 +30767,7 @@
             <p:ph sz="half" idx="1"/>
             <p:extLst>
               <p:ext uri="{D42A27DB-BD31-4B8C-83A1-F6EECF244321}">
-                <p14:modId xmlns:p14="http://schemas.microsoft.com/office/powerpoint/2010/main" val="2690223190"/>
+                <p14:modId xmlns:p14="http://schemas.microsoft.com/office/powerpoint/2010/main" val="579790988"/>
               </p:ext>
             </p:extLst>
           </p:nvPr>
@@ -30772,7 +30778,7 @@
         </p:xfrm>
         <a:graphic>
           <a:graphicData uri="http://schemas.openxmlformats.org/drawingml/2006/diagram">
-            <dgm:relIds xmlns:dgm="http://schemas.openxmlformats.org/drawingml/2006/diagram" xmlns:r="http://schemas.openxmlformats.org/officeDocument/2006/relationships" r:dm="rId2" r:lo="rId3" r:qs="rId4" r:cs="rId5"/>
+            <dgm:relIds xmlns:dgm="http://schemas.openxmlformats.org/drawingml/2006/diagram" xmlns:r="http://schemas.openxmlformats.org/officeDocument/2006/relationships" r:dm="rId3" r:lo="rId4" r:qs="rId5" r:cs="rId6"/>
           </a:graphicData>
         </a:graphic>
       </p:graphicFrame>
@@ -30795,101 +30801,65 @@
         <p:spPr/>
         <p:txBody>
           <a:bodyPr>
-            <a:normAutofit/>
+            <a:normAutofit fontScale="85000" lnSpcReduction="10000"/>
           </a:bodyPr>
           <a:lstStyle/>
           <a:p>
             <a:r>
               <a:rPr lang="en-US" dirty="0"/>
-              <a:t>Java: JDBC API, </a:t>
-            </a:r>
-            <a:r>
-              <a:rPr lang="en-US" dirty="0" err="1"/>
-              <a:t>DocumentBuilderFactory</a:t>
-            </a:r>
-            <a:r>
-              <a:rPr lang="en-US" dirty="0"/>
-              <a:t>, </a:t>
-            </a:r>
-            <a:r>
-              <a:rPr lang="en-US" dirty="0" err="1"/>
-              <a:t>TransformerFactory</a:t>
-            </a:r>
-            <a:r>
-              <a:rPr lang="en-US" dirty="0"/>
-              <a:t>, </a:t>
-            </a:r>
-            <a:r>
-              <a:rPr lang="en-US" dirty="0" err="1"/>
-              <a:t>XPathFactory</a:t>
+              <a:t>JavaScript: prototype inheritance</a:t>
+            </a:r>
+          </a:p>
+          <a:p>
+            <a:r>
+              <a:rPr lang="en-US" dirty="0">
+                <a:hlinkClick r:id="rId8"/>
+              </a:rPr>
+              <a:t>https://repl.it/@khaled_hossain_code/prototype</a:t>
             </a:r>
             <a:endParaRPr lang="en-US" dirty="0"/>
           </a:p>
           <a:p>
-            <a:pPr marL="0" indent="0">
-              <a:buNone/>
-            </a:pPr>
             <a:r>
               <a:rPr lang="en-US" dirty="0"/>
-              <a:t>.NET: </a:t>
-            </a:r>
-            <a:r>
-              <a:rPr lang="en-US" dirty="0" err="1"/>
-              <a:t>DbProviderFactory</a:t>
-            </a:r>
-            <a:r>
-              <a:rPr lang="en-US" dirty="0"/>
-              <a:t> class</a:t>
-            </a:r>
-          </a:p>
-          <a:p>
-            <a:pPr marL="0" indent="0">
-              <a:buNone/>
-            </a:pPr>
+              <a:t>Java: </a:t>
+            </a:r>
             <a:r>
               <a:rPr lang="en-US" dirty="0">
-                <a:hlinkClick r:id="rId7"/>
+                <a:hlinkClick r:id="rId9"/>
               </a:rPr>
-              <a:t>https://docs.microsoft.com/en-us/dotnet/api/system.data.common.dbproviderfactory?view=net-5.0</a:t>
+              <a:t>https://docs.oracle.com/javase/8/docs/api/java/lang/Cloneable.html</a:t>
             </a:r>
             <a:endParaRPr lang="en-US" dirty="0"/>
           </a:p>
           <a:p>
-            <a:pPr marL="0" indent="0">
-              <a:buNone/>
-            </a:pPr>
             <a:r>
               <a:rPr lang="en-US" dirty="0"/>
-              <a:t>Python: </a:t>
-            </a:r>
-            <a:r>
-              <a:rPr lang="en-US" dirty="0" err="1"/>
-              <a:t>factory_boy</a:t>
-            </a:r>
-            <a:r>
-              <a:rPr lang="en-US" dirty="0"/>
-              <a:t> </a:t>
+              <a:t>C#: </a:t>
             </a:r>
           </a:p>
           <a:p>
-            <a:pPr marL="0" indent="0">
-              <a:buNone/>
-            </a:pPr>
             <a:r>
               <a:rPr lang="en-US" dirty="0">
-                <a:hlinkClick r:id="rId8"/>
+                <a:hlinkClick r:id="rId10"/>
               </a:rPr>
-              <a:t>https://factoryboy.readthedocs.io/en/stable/index.html</a:t>
+              <a:t>https://docs.microsoft.com/en-us/dotnet/api/system.icloneable?view=net-5.0</a:t>
             </a:r>
             <a:endParaRPr lang="en-US" dirty="0"/>
           </a:p>
           <a:p>
-            <a:pPr marL="0" indent="0">
-              <a:buNone/>
-            </a:pPr>
-            <a:endParaRPr lang="en-US" dirty="0"/>
+            <a:r>
+              <a:rPr lang="en-US" dirty="0"/>
+              <a:t>Python: copy module </a:t>
+            </a:r>
           </a:p>
           <a:p>
+            <a:r>
+              <a:rPr lang="en-US" dirty="0">
+                <a:hlinkClick r:id="rId11"/>
+              </a:rPr>
+              <a:t>https://docs.python.org/2/library/copy.html</a:t>
+            </a:r>
             <a:endParaRPr lang="en-US" dirty="0"/>
           </a:p>
         </p:txBody>
@@ -31004,7 +30974,7 @@
     </p:spTree>
     <p:extLst>
       <p:ext uri="{BB962C8B-B14F-4D97-AF65-F5344CB8AC3E}">
-        <p14:creationId xmlns:p14="http://schemas.microsoft.com/office/powerpoint/2010/main" val="158230169"/>
+        <p14:creationId xmlns:p14="http://schemas.microsoft.com/office/powerpoint/2010/main" val="3250782400"/>
       </p:ext>
     </p:extLst>
   </p:cSld>
@@ -32114,15 +32084,6 @@
 </file>
 
 <file path=customXml/item2.xml><?xml version="1.0" encoding="utf-8"?>
-<?mso-contentType ?>
-<FormTemplates xmlns="http://schemas.microsoft.com/sharepoint/v3/contenttype/forms">
-  <Display>DocumentLibraryForm</Display>
-  <Edit>DocumentLibraryForm</Edit>
-  <New>DocumentLibraryForm</New>
-</FormTemplates>
-</file>
-
-<file path=customXml/item3.xml><?xml version="1.0" encoding="utf-8"?>
 <ct:contentTypeSchema xmlns:ct="http://schemas.microsoft.com/office/2006/metadata/contentType" xmlns:ma="http://schemas.microsoft.com/office/2006/metadata/properties/metaAttributes" ct:_="" ma:_="" ma:contentTypeName="Document" ma:contentTypeID="0x01010079F111ED35F8CC479449609E8A0923A6" ma:contentTypeVersion="12" ma:contentTypeDescription="Create a new document." ma:contentTypeScope="" ma:versionID="426e97fa315356fffbdcd9876fe988c2">
   <xsd:schema xmlns:xsd="http://www.w3.org/2001/XMLSchema" xmlns:xs="http://www.w3.org/2001/XMLSchema" xmlns:p="http://schemas.microsoft.com/office/2006/metadata/properties" xmlns:ns2="71af3243-3dd4-4a8d-8c0d-dd76da1f02a5" xmlns:ns3="16c05727-aa75-4e4a-9b5f-8a80a1165891" targetNamespace="http://schemas.microsoft.com/office/2006/metadata/properties" ma:root="true" ma:fieldsID="14b8f0def80e6d70ce3def20c90759ae" ns2:_="" ns3:_="">
     <xsd:import namespace="71af3243-3dd4-4a8d-8c0d-dd76da1f02a5"/>
@@ -32343,6 +32304,15 @@
 </ct:contentTypeSchema>
 </file>
 
+<file path=customXml/item3.xml><?xml version="1.0" encoding="utf-8"?>
+<?mso-contentType ?>
+<FormTemplates xmlns="http://schemas.microsoft.com/sharepoint/v3/contenttype/forms">
+  <Display>DocumentLibraryForm</Display>
+  <Edit>DocumentLibraryForm</Edit>
+  <New>DocumentLibraryForm</New>
+</FormTemplates>
+</file>
+
 <file path=customXml/itemProps1.xml><?xml version="1.0" encoding="utf-8"?>
 <ds:datastoreItem xmlns:ds="http://schemas.openxmlformats.org/officeDocument/2006/customXml" ds:itemID="{84F503EC-3FFF-4193-A86F-39150E2BAC75}">
   <ds:schemaRefs>
@@ -32354,14 +32324,6 @@
 </file>
 
 <file path=customXml/itemProps2.xml><?xml version="1.0" encoding="utf-8"?>
-<ds:datastoreItem xmlns:ds="http://schemas.openxmlformats.org/officeDocument/2006/customXml" ds:itemID="{2E5ECA37-C458-4BA2-A090-D7A19E07B434}">
-  <ds:schemaRefs>
-    <ds:schemaRef ds:uri="http://schemas.microsoft.com/sharepoint/v3/contenttype/forms"/>
-  </ds:schemaRefs>
-</ds:datastoreItem>
-</file>
-
-<file path=customXml/itemProps3.xml><?xml version="1.0" encoding="utf-8"?>
 <ds:datastoreItem xmlns:ds="http://schemas.openxmlformats.org/officeDocument/2006/customXml" ds:itemID="{7A26AAF5-6CFC-4C52-B7DF-08410EDE6701}">
   <ds:schemaRefs>
     <ds:schemaRef ds:uri="http://schemas.microsoft.com/office/2006/metadata/contentType"/>
@@ -32378,4 +32340,12 @@
     <ds:schemaRef ds:uri="http://schemas.microsoft.com/internal/obd"/>
   </ds:schemaRefs>
 </ds:datastoreItem>
+</file>
+
+<file path=customXml/itemProps3.xml><?xml version="1.0" encoding="utf-8"?>
+<ds:datastoreItem xmlns:ds="http://schemas.openxmlformats.org/officeDocument/2006/customXml" ds:itemID="{2E5ECA37-C458-4BA2-A090-D7A19E07B434}">
+  <ds:schemaRefs>
+    <ds:schemaRef ds:uri="http://schemas.microsoft.com/sharepoint/v3/contenttype/forms"/>
+  </ds:schemaRefs>
+</ds:datastoreItem>
 </file>
</xml_diff>